<commit_message>
Small edits on optimization slide deck
</commit_message>
<xml_diff>
--- a/SuplementaryMaterial/OptimizationForDeepLearning.pptx
+++ b/SuplementaryMaterial/OptimizationForDeepLearning.pptx
@@ -6,10 +6,10 @@
     <p:sldMasterId id="2147483672" r:id="rId5"/>
   </p:sldMasterIdLst>
   <p:notesMasterIdLst>
-    <p:notesMasterId r:id="rId61"/>
+    <p:notesMasterId r:id="rId60"/>
   </p:notesMasterIdLst>
   <p:handoutMasterIdLst>
-    <p:handoutMasterId r:id="rId62"/>
+    <p:handoutMasterId r:id="rId61"/>
   </p:handoutMasterIdLst>
   <p:sldIdLst>
     <p:sldId id="391" r:id="rId6"/>
@@ -31,42 +31,41 @@
     <p:sldId id="527" r:id="rId22"/>
     <p:sldId id="372" r:id="rId23"/>
     <p:sldId id="373" r:id="rId24"/>
-    <p:sldId id="525" r:id="rId25"/>
-    <p:sldId id="374" r:id="rId26"/>
-    <p:sldId id="375" r:id="rId27"/>
-    <p:sldId id="376" r:id="rId28"/>
-    <p:sldId id="377" r:id="rId29"/>
-    <p:sldId id="378" r:id="rId30"/>
-    <p:sldId id="379" r:id="rId31"/>
-    <p:sldId id="380" r:id="rId32"/>
-    <p:sldId id="381" r:id="rId33"/>
-    <p:sldId id="510" r:id="rId34"/>
-    <p:sldId id="511" r:id="rId35"/>
-    <p:sldId id="512" r:id="rId36"/>
-    <p:sldId id="513" r:id="rId37"/>
-    <p:sldId id="514" r:id="rId38"/>
-    <p:sldId id="515" r:id="rId39"/>
-    <p:sldId id="516" r:id="rId40"/>
-    <p:sldId id="517" r:id="rId41"/>
-    <p:sldId id="518" r:id="rId42"/>
-    <p:sldId id="519" r:id="rId43"/>
-    <p:sldId id="520" r:id="rId44"/>
-    <p:sldId id="521" r:id="rId45"/>
-    <p:sldId id="480" r:id="rId46"/>
-    <p:sldId id="329" r:id="rId47"/>
-    <p:sldId id="343" r:id="rId48"/>
-    <p:sldId id="344" r:id="rId49"/>
-    <p:sldId id="346" r:id="rId50"/>
-    <p:sldId id="347" r:id="rId51"/>
-    <p:sldId id="348" r:id="rId52"/>
-    <p:sldId id="349" r:id="rId53"/>
-    <p:sldId id="392" r:id="rId54"/>
-    <p:sldId id="393" r:id="rId55"/>
-    <p:sldId id="394" r:id="rId56"/>
-    <p:sldId id="395" r:id="rId57"/>
-    <p:sldId id="396" r:id="rId58"/>
-    <p:sldId id="397" r:id="rId59"/>
-    <p:sldId id="398" r:id="rId60"/>
+    <p:sldId id="374" r:id="rId25"/>
+    <p:sldId id="375" r:id="rId26"/>
+    <p:sldId id="376" r:id="rId27"/>
+    <p:sldId id="377" r:id="rId28"/>
+    <p:sldId id="378" r:id="rId29"/>
+    <p:sldId id="379" r:id="rId30"/>
+    <p:sldId id="380" r:id="rId31"/>
+    <p:sldId id="381" r:id="rId32"/>
+    <p:sldId id="510" r:id="rId33"/>
+    <p:sldId id="511" r:id="rId34"/>
+    <p:sldId id="512" r:id="rId35"/>
+    <p:sldId id="513" r:id="rId36"/>
+    <p:sldId id="514" r:id="rId37"/>
+    <p:sldId id="515" r:id="rId38"/>
+    <p:sldId id="516" r:id="rId39"/>
+    <p:sldId id="517" r:id="rId40"/>
+    <p:sldId id="518" r:id="rId41"/>
+    <p:sldId id="519" r:id="rId42"/>
+    <p:sldId id="520" r:id="rId43"/>
+    <p:sldId id="521" r:id="rId44"/>
+    <p:sldId id="480" r:id="rId45"/>
+    <p:sldId id="329" r:id="rId46"/>
+    <p:sldId id="343" r:id="rId47"/>
+    <p:sldId id="344" r:id="rId48"/>
+    <p:sldId id="346" r:id="rId49"/>
+    <p:sldId id="347" r:id="rId50"/>
+    <p:sldId id="348" r:id="rId51"/>
+    <p:sldId id="349" r:id="rId52"/>
+    <p:sldId id="392" r:id="rId53"/>
+    <p:sldId id="393" r:id="rId54"/>
+    <p:sldId id="394" r:id="rId55"/>
+    <p:sldId id="395" r:id="rId56"/>
+    <p:sldId id="396" r:id="rId57"/>
+    <p:sldId id="397" r:id="rId58"/>
+    <p:sldId id="398" r:id="rId59"/>
   </p:sldIdLst>
   <p:sldSz cx="12192000" cy="6858000"/>
   <p:notesSz cx="7010400" cy="9296400"/>
@@ -269,7 +268,7 @@
           <a:p>
             <a:fld id="{312E7B4A-039C-48A2-9B2C-AF16AA3873D8}" type="datetimeFigureOut">
               <a:rPr lang="en-US" smtClean="0"/>
-              <a:t>2/26/2024</a:t>
+              <a:t>2/24/2025</a:t>
             </a:fld>
             <a:endParaRPr lang="en-US" dirty="0"/>
           </a:p>
@@ -434,7 +433,7 @@
           <a:p>
             <a:fld id="{DA005A0C-54D9-45AA-87D4-C551D08DFCE1}" type="datetimeFigureOut">
               <a:rPr lang="en-US" smtClean="0"/>
-              <a:t>2/26/2024</a:t>
+              <a:t>2/24/2025</a:t>
             </a:fld>
             <a:endParaRPr lang="en-US" dirty="0"/>
           </a:p>
@@ -867,7 +866,7 @@
     </p:spTree>
     <p:extLst>
       <p:ext uri="{BB962C8B-B14F-4D97-AF65-F5344CB8AC3E}">
-        <p14:creationId xmlns:p14="http://schemas.microsoft.com/office/powerpoint/2010/main" val="4256575722"/>
+        <p14:creationId xmlns:p14="http://schemas.microsoft.com/office/powerpoint/2010/main" val="2667129048"/>
       </p:ext>
     </p:extLst>
   </p:cSld>
@@ -951,7 +950,7 @@
     </p:spTree>
     <p:extLst>
       <p:ext uri="{BB962C8B-B14F-4D97-AF65-F5344CB8AC3E}">
-        <p14:creationId xmlns:p14="http://schemas.microsoft.com/office/powerpoint/2010/main" val="2667129048"/>
+        <p14:creationId xmlns:p14="http://schemas.microsoft.com/office/powerpoint/2010/main" val="199940273"/>
       </p:ext>
     </p:extLst>
   </p:cSld>
@@ -1026,7 +1025,7 @@
           <a:p>
             <a:fld id="{4CFD207A-07DF-40AD-A916-9872E089CE7A}" type="slidenum">
               <a:rPr lang="en-US" smtClean="0"/>
-              <a:t>22</a:t>
+              <a:t>25</a:t>
             </a:fld>
             <a:endParaRPr lang="en-US" dirty="0"/>
           </a:p>
@@ -1035,7 +1034,7 @@
     </p:spTree>
     <p:extLst>
       <p:ext uri="{BB962C8B-B14F-4D97-AF65-F5344CB8AC3E}">
-        <p14:creationId xmlns:p14="http://schemas.microsoft.com/office/powerpoint/2010/main" val="199940273"/>
+        <p14:creationId xmlns:p14="http://schemas.microsoft.com/office/powerpoint/2010/main" val="2642926781"/>
       </p:ext>
     </p:extLst>
   </p:cSld>
@@ -1119,7 +1118,7 @@
     </p:spTree>
     <p:extLst>
       <p:ext uri="{BB962C8B-B14F-4D97-AF65-F5344CB8AC3E}">
-        <p14:creationId xmlns:p14="http://schemas.microsoft.com/office/powerpoint/2010/main" val="2642926781"/>
+        <p14:creationId xmlns:p14="http://schemas.microsoft.com/office/powerpoint/2010/main" val="822441824"/>
       </p:ext>
     </p:extLst>
   </p:cSld>
@@ -1194,7 +1193,7 @@
           <a:p>
             <a:fld id="{4CFD207A-07DF-40AD-A916-9872E089CE7A}" type="slidenum">
               <a:rPr lang="en-US" smtClean="0"/>
-              <a:t>27</a:t>
+              <a:t>32</a:t>
             </a:fld>
             <a:endParaRPr lang="en-US" dirty="0"/>
           </a:p>
@@ -1203,7 +1202,7 @@
     </p:spTree>
     <p:extLst>
       <p:ext uri="{BB962C8B-B14F-4D97-AF65-F5344CB8AC3E}">
-        <p14:creationId xmlns:p14="http://schemas.microsoft.com/office/powerpoint/2010/main" val="822441824"/>
+        <p14:creationId xmlns:p14="http://schemas.microsoft.com/office/powerpoint/2010/main" val="961411457"/>
       </p:ext>
     </p:extLst>
   </p:cSld>
@@ -1278,91 +1277,7 @@
           <a:p>
             <a:fld id="{4CFD207A-07DF-40AD-A916-9872E089CE7A}" type="slidenum">
               <a:rPr lang="en-US" smtClean="0"/>
-              <a:t>33</a:t>
-            </a:fld>
-            <a:endParaRPr lang="en-US" dirty="0"/>
-          </a:p>
-        </p:txBody>
-      </p:sp>
-    </p:spTree>
-    <p:extLst>
-      <p:ext uri="{BB962C8B-B14F-4D97-AF65-F5344CB8AC3E}">
-        <p14:creationId xmlns:p14="http://schemas.microsoft.com/office/powerpoint/2010/main" val="961411457"/>
-      </p:ext>
-    </p:extLst>
-  </p:cSld>
-  <p:clrMapOvr>
-    <a:masterClrMapping/>
-  </p:clrMapOvr>
-</p:notes>
-</file>
-
-<file path=ppt/notesSlides/notesSlide16.xml><?xml version="1.0" encoding="utf-8"?>
-<p:notes xmlns:a="http://schemas.openxmlformats.org/drawingml/2006/main" xmlns:r="http://schemas.openxmlformats.org/officeDocument/2006/relationships" xmlns:p="http://schemas.openxmlformats.org/presentationml/2006/main">
-  <p:cSld>
-    <p:spTree>
-      <p:nvGrpSpPr>
-        <p:cNvPr id="1" name=""/>
-        <p:cNvGrpSpPr/>
-        <p:nvPr/>
-      </p:nvGrpSpPr>
-      <p:grpSpPr>
-        <a:xfrm>
-          <a:off x="0" y="0"/>
-          <a:ext cx="0" cy="0"/>
-          <a:chOff x="0" y="0"/>
-          <a:chExt cx="0" cy="0"/>
-        </a:xfrm>
-      </p:grpSpPr>
-      <p:sp>
-        <p:nvSpPr>
-          <p:cNvPr id="2" name="Slide Image Placeholder 1"/>
-          <p:cNvSpPr>
-            <a:spLocks noGrp="1" noRot="1" noChangeAspect="1"/>
-          </p:cNvSpPr>
-          <p:nvPr>
-            <p:ph type="sldImg"/>
-          </p:nvPr>
-        </p:nvSpPr>
-        <p:spPr/>
-      </p:sp>
-      <p:sp>
-        <p:nvSpPr>
-          <p:cNvPr id="3" name="Notes Placeholder 2"/>
-          <p:cNvSpPr>
-            <a:spLocks noGrp="1"/>
-          </p:cNvSpPr>
-          <p:nvPr>
-            <p:ph type="body" idx="1"/>
-          </p:nvPr>
-        </p:nvSpPr>
-        <p:spPr/>
-        <p:txBody>
-          <a:bodyPr/>
-          <a:lstStyle/>
-          <a:p>
-            <a:endParaRPr lang="en-US" dirty="0"/>
-          </a:p>
-        </p:txBody>
-      </p:sp>
-      <p:sp>
-        <p:nvSpPr>
-          <p:cNvPr id="4" name="Slide Number Placeholder 3"/>
-          <p:cNvSpPr>
-            <a:spLocks noGrp="1"/>
-          </p:cNvSpPr>
-          <p:nvPr>
-            <p:ph type="sldNum" sz="quarter" idx="5"/>
-          </p:nvPr>
-        </p:nvSpPr>
-        <p:spPr/>
-        <p:txBody>
-          <a:bodyPr/>
-          <a:lstStyle/>
-          <a:p>
-            <a:fld id="{4CFD207A-07DF-40AD-A916-9872E089CE7A}" type="slidenum">
-              <a:rPr lang="en-US" smtClean="0"/>
-              <a:t>37</a:t>
+              <a:t>36</a:t>
             </a:fld>
             <a:endParaRPr lang="en-US" dirty="0"/>
           </a:p>
@@ -2449,7 +2364,7 @@
           <a:p>
             <a:fld id="{F4085E44-FE1D-42BD-8BEC-66E1A7095121}" type="datetimeFigureOut">
               <a:rPr lang="en-US" smtClean="0"/>
-              <a:t>2/26/2024</a:t>
+              <a:t>2/24/2025</a:t>
             </a:fld>
             <a:endParaRPr lang="en-US"/>
           </a:p>
@@ -2737,7 +2652,7 @@
           <a:p>
             <a:fld id="{F4085E44-FE1D-42BD-8BEC-66E1A7095121}" type="datetimeFigureOut">
               <a:rPr lang="en-US" smtClean="0"/>
-              <a:t>2/26/2024</a:t>
+              <a:t>2/24/2025</a:t>
             </a:fld>
             <a:endParaRPr lang="en-US"/>
           </a:p>
@@ -2935,7 +2850,7 @@
           <a:p>
             <a:fld id="{F4085E44-FE1D-42BD-8BEC-66E1A7095121}" type="datetimeFigureOut">
               <a:rPr lang="en-US" smtClean="0"/>
-              <a:t>2/26/2024</a:t>
+              <a:t>2/24/2025</a:t>
             </a:fld>
             <a:endParaRPr lang="en-US"/>
           </a:p>
@@ -3143,7 +3058,7 @@
           <a:p>
             <a:fld id="{F4085E44-FE1D-42BD-8BEC-66E1A7095121}" type="datetimeFigureOut">
               <a:rPr lang="en-US" smtClean="0"/>
-              <a:t>2/26/2024</a:t>
+              <a:t>2/24/2025</a:t>
             </a:fld>
             <a:endParaRPr lang="en-US"/>
           </a:p>
@@ -3541,7 +3456,7 @@
           <a:p>
             <a:fld id="{F4085E44-FE1D-42BD-8BEC-66E1A7095121}" type="datetimeFigureOut">
               <a:rPr lang="en-US" smtClean="0"/>
-              <a:t>2/26/2024</a:t>
+              <a:t>2/24/2025</a:t>
             </a:fld>
             <a:endParaRPr lang="en-US"/>
           </a:p>
@@ -3739,7 +3654,7 @@
           <a:p>
             <a:fld id="{F4085E44-FE1D-42BD-8BEC-66E1A7095121}" type="datetimeFigureOut">
               <a:rPr lang="en-US" smtClean="0"/>
-              <a:t>2/26/2024</a:t>
+              <a:t>2/24/2025</a:t>
             </a:fld>
             <a:endParaRPr lang="en-US"/>
           </a:p>
@@ -4014,7 +3929,7 @@
           <a:p>
             <a:fld id="{F4085E44-FE1D-42BD-8BEC-66E1A7095121}" type="datetimeFigureOut">
               <a:rPr lang="en-US" smtClean="0"/>
-              <a:t>2/26/2024</a:t>
+              <a:t>2/24/2025</a:t>
             </a:fld>
             <a:endParaRPr lang="en-US"/>
           </a:p>
@@ -4279,7 +4194,7 @@
           <a:p>
             <a:fld id="{F4085E44-FE1D-42BD-8BEC-66E1A7095121}" type="datetimeFigureOut">
               <a:rPr lang="en-US" smtClean="0"/>
-              <a:t>2/26/2024</a:t>
+              <a:t>2/24/2025</a:t>
             </a:fld>
             <a:endParaRPr lang="en-US"/>
           </a:p>
@@ -4691,7 +4606,7 @@
           <a:p>
             <a:fld id="{F4085E44-FE1D-42BD-8BEC-66E1A7095121}" type="datetimeFigureOut">
               <a:rPr lang="en-US" smtClean="0"/>
-              <a:t>2/26/2024</a:t>
+              <a:t>2/24/2025</a:t>
             </a:fld>
             <a:endParaRPr lang="en-US"/>
           </a:p>
@@ -4832,7 +4747,7 @@
           <a:p>
             <a:fld id="{F4085E44-FE1D-42BD-8BEC-66E1A7095121}" type="datetimeFigureOut">
               <a:rPr lang="en-US" smtClean="0"/>
-              <a:t>2/26/2024</a:t>
+              <a:t>2/24/2025</a:t>
             </a:fld>
             <a:endParaRPr lang="en-US"/>
           </a:p>
@@ -4945,7 +4860,7 @@
           <a:p>
             <a:fld id="{F4085E44-FE1D-42BD-8BEC-66E1A7095121}" type="datetimeFigureOut">
               <a:rPr lang="en-US" smtClean="0"/>
-              <a:t>2/26/2024</a:t>
+              <a:t>2/24/2025</a:t>
             </a:fld>
             <a:endParaRPr lang="en-US"/>
           </a:p>
@@ -5514,7 +5429,7 @@
           <a:p>
             <a:fld id="{F4085E44-FE1D-42BD-8BEC-66E1A7095121}" type="datetimeFigureOut">
               <a:rPr lang="en-US" smtClean="0"/>
-              <a:t>2/26/2024</a:t>
+              <a:t>2/24/2025</a:t>
             </a:fld>
             <a:endParaRPr lang="en-US"/>
           </a:p>
@@ -6286,7 +6201,7 @@
                 <a:ea typeface="+mn-ea"/>
                 <a:cs typeface="+mn-cs"/>
               </a:rPr>
-              <a:t>Copyright 2021, 2022, 2023, 2024</a:t>
+              <a:t>Copyright 2021, 2022, 2023, 2024, 2025</a:t>
             </a:r>
           </a:p>
           <a:p>
@@ -11888,7 +11803,7 @@
                 <a:latin typeface="Segoe UI" panose="020B0502040204020203" pitchFamily="34" charset="0"/>
                 <a:cs typeface="Segoe UI" panose="020B0502040204020203" pitchFamily="34" charset="0"/>
               </a:rPr>
-              <a:t>The Hessian is symmetric since</a:t>
+              <a:t>The real-valued Hessian is symmetric since</a:t>
             </a:r>
           </a:p>
           <a:p>
@@ -12127,7 +12042,7 @@
         </p:blipFill>
         <p:spPr>
           <a:xfrm>
-            <a:off x="5791200" y="1325880"/>
+            <a:off x="7444352" y="1336212"/>
             <a:ext cx="2489835" cy="867426"/>
           </a:xfrm>
           <a:prstGeom prst="rect">
@@ -13059,719 +12974,6 @@
 </file>
 
 <file path=ppt/slides/slide20.xml><?xml version="1.0" encoding="utf-8"?>
-<p:sld xmlns:a="http://schemas.openxmlformats.org/drawingml/2006/main" xmlns:r="http://schemas.openxmlformats.org/officeDocument/2006/relationships" xmlns:p="http://schemas.openxmlformats.org/presentationml/2006/main">
-  <p:cSld>
-    <p:spTree>
-      <p:nvGrpSpPr>
-        <p:cNvPr id="1" name=""/>
-        <p:cNvGrpSpPr/>
-        <p:nvPr/>
-      </p:nvGrpSpPr>
-      <p:grpSpPr>
-        <a:xfrm>
-          <a:off x="0" y="0"/>
-          <a:ext cx="0" cy="0"/>
-          <a:chOff x="0" y="0"/>
-          <a:chExt cx="0" cy="0"/>
-        </a:xfrm>
-      </p:grpSpPr>
-      <p:sp>
-        <p:nvSpPr>
-          <p:cNvPr id="2" name="Title 1">
-            <a:extLst>
-              <a:ext uri="{FF2B5EF4-FFF2-40B4-BE49-F238E27FC236}">
-                <a16:creationId xmlns:a16="http://schemas.microsoft.com/office/drawing/2014/main" id="{EC94791F-1349-402E-BD8E-854A4676DC46}"/>
-              </a:ext>
-            </a:extLst>
-          </p:cNvPr>
-          <p:cNvSpPr>
-            <a:spLocks noGrp="1"/>
-          </p:cNvSpPr>
-          <p:nvPr>
-            <p:ph type="title"/>
-          </p:nvPr>
-        </p:nvSpPr>
-        <p:spPr>
-          <a:xfrm>
-            <a:off x="379514" y="182216"/>
-            <a:ext cx="11524432" cy="772190"/>
-          </a:xfrm>
-        </p:spPr>
-        <p:txBody>
-          <a:bodyPr>
-            <a:normAutofit/>
-          </a:bodyPr>
-          <a:lstStyle/>
-          <a:p>
-            <a:r>
-              <a:rPr lang="en-US" sz="4000" dirty="0">
-                <a:latin typeface="Segoe UI" panose="020B0502040204020203" pitchFamily="34" charset="0"/>
-                <a:cs typeface="Segoe UI" panose="020B0502040204020203" pitchFamily="34" charset="0"/>
-              </a:rPr>
-              <a:t>The Nature of Gradients</a:t>
-            </a:r>
-          </a:p>
-        </p:txBody>
-      </p:sp>
-      <p:sp>
-        <p:nvSpPr>
-          <p:cNvPr id="3" name="Content Placeholder 2">
-            <a:extLst>
-              <a:ext uri="{FF2B5EF4-FFF2-40B4-BE49-F238E27FC236}">
-                <a16:creationId xmlns:a16="http://schemas.microsoft.com/office/drawing/2014/main" id="{503C7F73-8148-4FB5-B202-D57F58BF6F3E}"/>
-              </a:ext>
-            </a:extLst>
-          </p:cNvPr>
-          <p:cNvSpPr>
-            <a:spLocks noGrp="1"/>
-          </p:cNvSpPr>
-          <p:nvPr>
-            <p:ph sz="quarter" idx="10"/>
-          </p:nvPr>
-        </p:nvSpPr>
-        <p:spPr>
-          <a:xfrm>
-            <a:off x="333375" y="876493"/>
-            <a:ext cx="11525250" cy="675862"/>
-          </a:xfrm>
-        </p:spPr>
-        <p:txBody>
-          <a:bodyPr/>
-          <a:lstStyle/>
-          <a:p>
-            <a:pPr marL="0" indent="0">
-              <a:buNone/>
-            </a:pPr>
-            <a:r>
-              <a:rPr lang="en-US" sz="3000" dirty="0">
-                <a:latin typeface="Segoe UI" panose="020B0502040204020203" pitchFamily="34" charset="0"/>
-                <a:cs typeface="Segoe UI" panose="020B0502040204020203" pitchFamily="34" charset="0"/>
-              </a:rPr>
-              <a:t>Some key properties of the Hessian matrix:</a:t>
-            </a:r>
-          </a:p>
-          <a:p>
-            <a:pPr lvl="1">
-              <a:buFont typeface="Wingdings" panose="05000000000000000000" pitchFamily="2" charset="2"/>
-              <a:buChar char="§"/>
-            </a:pPr>
-            <a:r>
-              <a:rPr lang="en-US" sz="2600" dirty="0">
-                <a:latin typeface="Segoe UI" panose="020B0502040204020203" pitchFamily="34" charset="0"/>
-                <a:cs typeface="Segoe UI" panose="020B0502040204020203" pitchFamily="34" charset="0"/>
-              </a:rPr>
-              <a:t>The Hessian is symmetric since</a:t>
-            </a:r>
-          </a:p>
-          <a:p>
-            <a:pPr lvl="1">
-              <a:buFont typeface="Wingdings" panose="05000000000000000000" pitchFamily="2" charset="2"/>
-              <a:buChar char="§"/>
-            </a:pPr>
-            <a:endParaRPr lang="en-US" sz="2600" dirty="0">
-              <a:latin typeface="Segoe UI" panose="020B0502040204020203" pitchFamily="34" charset="0"/>
-              <a:cs typeface="Segoe UI" panose="020B0502040204020203" pitchFamily="34" charset="0"/>
-            </a:endParaRPr>
-          </a:p>
-          <a:p>
-            <a:pPr lvl="1">
-              <a:buFont typeface="Wingdings" panose="05000000000000000000" pitchFamily="2" charset="2"/>
-              <a:buChar char="§"/>
-            </a:pPr>
-            <a:r>
-              <a:rPr lang="en-US" sz="2600" dirty="0">
-                <a:latin typeface="Segoe UI" panose="020B0502040204020203" pitchFamily="34" charset="0"/>
-                <a:cs typeface="Segoe UI" panose="020B0502040204020203" pitchFamily="34" charset="0"/>
-              </a:rPr>
-              <a:t>For a convex loss function the Hessian has all </a:t>
-            </a:r>
-            <a:r>
-              <a:rPr lang="en-US" sz="2600" b="1" dirty="0">
-                <a:latin typeface="Segoe UI" panose="020B0502040204020203" pitchFamily="34" charset="0"/>
-                <a:cs typeface="Segoe UI" panose="020B0502040204020203" pitchFamily="34" charset="0"/>
-              </a:rPr>
-              <a:t>positive eigenvalues</a:t>
-            </a:r>
-            <a:r>
-              <a:rPr lang="en-US" sz="2600" dirty="0">
-                <a:latin typeface="Segoe UI" panose="020B0502040204020203" pitchFamily="34" charset="0"/>
-                <a:cs typeface="Segoe UI" panose="020B0502040204020203" pitchFamily="34" charset="0"/>
-              </a:rPr>
-              <a:t>; it is </a:t>
-            </a:r>
-            <a:r>
-              <a:rPr lang="en-US" sz="2600" b="1" dirty="0">
-                <a:latin typeface="Segoe UI" panose="020B0502040204020203" pitchFamily="34" charset="0"/>
-                <a:cs typeface="Segoe UI" panose="020B0502040204020203" pitchFamily="34" charset="0"/>
-              </a:rPr>
-              <a:t>positive definite</a:t>
-            </a:r>
-            <a:r>
-              <a:rPr lang="en-US" sz="2600" dirty="0">
-                <a:latin typeface="Segoe UI" panose="020B0502040204020203" pitchFamily="34" charset="0"/>
-                <a:cs typeface="Segoe UI" panose="020B0502040204020203" pitchFamily="34" charset="0"/>
-              </a:rPr>
-              <a:t> – a maximum</a:t>
-            </a:r>
-          </a:p>
-          <a:p>
-            <a:pPr lvl="1">
-              <a:buFont typeface="Wingdings" panose="05000000000000000000" pitchFamily="2" charset="2"/>
-              <a:buChar char="§"/>
-            </a:pPr>
-            <a:r>
-              <a:rPr lang="en-US" sz="2600" dirty="0">
-                <a:latin typeface="Segoe UI" panose="020B0502040204020203" pitchFamily="34" charset="0"/>
-                <a:cs typeface="Segoe UI" panose="020B0502040204020203" pitchFamily="34" charset="0"/>
-              </a:rPr>
-              <a:t>At a maximum point the Hessian has all </a:t>
-            </a:r>
-            <a:r>
-              <a:rPr lang="en-US" sz="2600" b="1" dirty="0">
-                <a:latin typeface="Segoe UI" panose="020B0502040204020203" pitchFamily="34" charset="0"/>
-                <a:cs typeface="Segoe UI" panose="020B0502040204020203" pitchFamily="34" charset="0"/>
-              </a:rPr>
-              <a:t>negative eigenvalues</a:t>
-            </a:r>
-            <a:r>
-              <a:rPr lang="en-US" sz="2600" dirty="0">
-                <a:latin typeface="Segoe UI" panose="020B0502040204020203" pitchFamily="34" charset="0"/>
-                <a:cs typeface="Segoe UI" panose="020B0502040204020203" pitchFamily="34" charset="0"/>
-              </a:rPr>
-              <a:t>; it is </a:t>
-            </a:r>
-            <a:r>
-              <a:rPr lang="en-US" sz="2600" b="1" dirty="0">
-                <a:latin typeface="Segoe UI" panose="020B0502040204020203" pitchFamily="34" charset="0"/>
-                <a:cs typeface="Segoe UI" panose="020B0502040204020203" pitchFamily="34" charset="0"/>
-              </a:rPr>
-              <a:t>negative definite </a:t>
-            </a:r>
-            <a:r>
-              <a:rPr lang="en-US" sz="2600" dirty="0">
-                <a:latin typeface="Segoe UI" panose="020B0502040204020203" pitchFamily="34" charset="0"/>
-                <a:cs typeface="Segoe UI" panose="020B0502040204020203" pitchFamily="34" charset="0"/>
-              </a:rPr>
-              <a:t>- minimum</a:t>
-            </a:r>
-            <a:r>
-              <a:rPr lang="en-US" sz="2600" b="1" dirty="0">
-                <a:latin typeface="Segoe UI" panose="020B0502040204020203" pitchFamily="34" charset="0"/>
-                <a:cs typeface="Segoe UI" panose="020B0502040204020203" pitchFamily="34" charset="0"/>
-              </a:rPr>
-              <a:t> </a:t>
-            </a:r>
-          </a:p>
-          <a:p>
-            <a:pPr lvl="1">
-              <a:buFont typeface="Wingdings" panose="05000000000000000000" pitchFamily="2" charset="2"/>
-              <a:buChar char="§"/>
-            </a:pPr>
-            <a:r>
-              <a:rPr lang="en-US" sz="2600" dirty="0">
-                <a:latin typeface="Segoe UI" panose="020B0502040204020203" pitchFamily="34" charset="0"/>
-                <a:cs typeface="Segoe UI" panose="020B0502040204020203" pitchFamily="34" charset="0"/>
-              </a:rPr>
-              <a:t>The Hessian has </a:t>
-            </a:r>
-            <a:r>
-              <a:rPr lang="en-US" sz="2600" b="1" dirty="0">
-                <a:latin typeface="Segoe UI" panose="020B0502040204020203" pitchFamily="34" charset="0"/>
-                <a:cs typeface="Segoe UI" panose="020B0502040204020203" pitchFamily="34" charset="0"/>
-              </a:rPr>
-              <a:t>some positive and some negative eigenvalues </a:t>
-            </a:r>
-            <a:r>
-              <a:rPr lang="en-US" sz="2600" dirty="0">
-                <a:latin typeface="Segoe UI" panose="020B0502040204020203" pitchFamily="34" charset="0"/>
-                <a:cs typeface="Segoe UI" panose="020B0502040204020203" pitchFamily="34" charset="0"/>
-              </a:rPr>
-              <a:t>at a </a:t>
-            </a:r>
-            <a:r>
-              <a:rPr lang="en-US" sz="2600" b="1" dirty="0">
-                <a:latin typeface="Segoe UI" panose="020B0502040204020203" pitchFamily="34" charset="0"/>
-                <a:cs typeface="Segoe UI" panose="020B0502040204020203" pitchFamily="34" charset="0"/>
-              </a:rPr>
-              <a:t>saddle point</a:t>
-            </a:r>
-            <a:endParaRPr lang="en-US" sz="2600" dirty="0">
-              <a:latin typeface="Segoe UI" panose="020B0502040204020203" pitchFamily="34" charset="0"/>
-              <a:cs typeface="Segoe UI" panose="020B0502040204020203" pitchFamily="34" charset="0"/>
-            </a:endParaRPr>
-          </a:p>
-          <a:p>
-            <a:pPr lvl="1">
-              <a:buFont typeface="Wingdings" panose="05000000000000000000" pitchFamily="2" charset="2"/>
-              <a:buChar char="§"/>
-            </a:pPr>
-            <a:r>
-              <a:rPr lang="en-US" sz="2600" dirty="0">
-                <a:latin typeface="Segoe UI" panose="020B0502040204020203" pitchFamily="34" charset="0"/>
-                <a:cs typeface="Segoe UI" panose="020B0502040204020203" pitchFamily="34" charset="0"/>
-              </a:rPr>
-              <a:t>Saddle points are problematic since direction of descent to the minimum is unclear</a:t>
-            </a:r>
-          </a:p>
-          <a:p>
-            <a:pPr lvl="1">
-              <a:buFont typeface="Wingdings" panose="05000000000000000000" pitchFamily="2" charset="2"/>
-              <a:buChar char="§"/>
-            </a:pPr>
-            <a:r>
-              <a:rPr lang="en-US" sz="2600" dirty="0">
-                <a:latin typeface="Segoe UI" panose="020B0502040204020203" pitchFamily="34" charset="0"/>
-                <a:cs typeface="Segoe UI" panose="020B0502040204020203" pitchFamily="34" charset="0"/>
-              </a:rPr>
-              <a:t>If Hessian has some </a:t>
-            </a:r>
-            <a:r>
-              <a:rPr lang="en-US" sz="2600" b="1" dirty="0">
-                <a:latin typeface="Segoe UI" panose="020B0502040204020203" pitchFamily="34" charset="0"/>
-                <a:cs typeface="Segoe UI" panose="020B0502040204020203" pitchFamily="34" charset="0"/>
-              </a:rPr>
-              <a:t>very small eigenvalues</a:t>
-            </a:r>
-            <a:r>
-              <a:rPr lang="en-US" sz="2600" dirty="0">
-                <a:latin typeface="Segoe UI" panose="020B0502040204020203" pitchFamily="34" charset="0"/>
-                <a:cs typeface="Segoe UI" panose="020B0502040204020203" pitchFamily="34" charset="0"/>
-              </a:rPr>
-              <a:t>, the gradient is low and </a:t>
-            </a:r>
-            <a:r>
-              <a:rPr lang="en-US" sz="2600" b="1" dirty="0">
-                <a:latin typeface="Segoe UI" panose="020B0502040204020203" pitchFamily="34" charset="0"/>
-                <a:cs typeface="Segoe UI" panose="020B0502040204020203" pitchFamily="34" charset="0"/>
-              </a:rPr>
-              <a:t>convergence will be slow</a:t>
-            </a:r>
-          </a:p>
-          <a:p>
-            <a:pPr marL="457046" lvl="1" indent="0">
-              <a:buNone/>
-            </a:pPr>
-            <a:endParaRPr lang="en-US" sz="2600" dirty="0">
-              <a:latin typeface="Segoe UI" panose="020B0502040204020203" pitchFamily="34" charset="0"/>
-              <a:cs typeface="Segoe UI" panose="020B0502040204020203" pitchFamily="34" charset="0"/>
-            </a:endParaRPr>
-          </a:p>
-          <a:p>
-            <a:pPr lvl="1">
-              <a:buFont typeface="Wingdings" panose="05000000000000000000" pitchFamily="2" charset="2"/>
-              <a:buChar char="§"/>
-            </a:pPr>
-            <a:endParaRPr lang="en-US" sz="2600" dirty="0">
-              <a:latin typeface="Segoe UI" panose="020B0502040204020203" pitchFamily="34" charset="0"/>
-              <a:cs typeface="Segoe UI" panose="020B0502040204020203" pitchFamily="34" charset="0"/>
-            </a:endParaRPr>
-          </a:p>
-          <a:p>
-            <a:pPr marL="0" indent="0">
-              <a:buNone/>
-            </a:pPr>
-            <a:endParaRPr lang="en-US" sz="3000" dirty="0">
-              <a:latin typeface="Segoe UI" panose="020B0502040204020203" pitchFamily="34" charset="0"/>
-              <a:cs typeface="Segoe UI" panose="020B0502040204020203" pitchFamily="34" charset="0"/>
-            </a:endParaRPr>
-          </a:p>
-        </p:txBody>
-      </p:sp>
-      <p:pic>
-        <p:nvPicPr>
-          <p:cNvPr id="6" name="Picture 5">
-            <a:extLst>
-              <a:ext uri="{FF2B5EF4-FFF2-40B4-BE49-F238E27FC236}">
-                <a16:creationId xmlns:a16="http://schemas.microsoft.com/office/drawing/2014/main" id="{E65D387D-17F5-4EFF-AF7C-169336C4BF52}"/>
-              </a:ext>
-            </a:extLst>
-          </p:cNvPr>
-          <p:cNvPicPr>
-            <a:picLocks noChangeAspect="1"/>
-          </p:cNvPicPr>
-          <p:nvPr/>
-        </p:nvPicPr>
-        <p:blipFill>
-          <a:blip r:embed="rId3"/>
-          <a:stretch>
-            <a:fillRect/>
-          </a:stretch>
-        </p:blipFill>
-        <p:spPr>
-          <a:xfrm>
-            <a:off x="5791200" y="1325880"/>
-            <a:ext cx="2489835" cy="867426"/>
-          </a:xfrm>
-          <a:prstGeom prst="rect">
-            <a:avLst/>
-          </a:prstGeom>
-        </p:spPr>
-      </p:pic>
-    </p:spTree>
-    <p:extLst>
-      <p:ext uri="{BB962C8B-B14F-4D97-AF65-F5344CB8AC3E}">
-        <p14:creationId xmlns:p14="http://schemas.microsoft.com/office/powerpoint/2010/main" val="2877490061"/>
-      </p:ext>
-    </p:extLst>
-  </p:cSld>
-  <p:clrMapOvr>
-    <a:masterClrMapping/>
-  </p:clrMapOvr>
-  <p:timing>
-    <p:tnLst>
-      <p:par>
-        <p:cTn id="1" dur="indefinite" restart="never" nodeType="tmRoot">
-          <p:childTnLst>
-            <p:seq concurrent="1" nextAc="seek">
-              <p:cTn id="2" dur="indefinite" nodeType="mainSeq">
-                <p:childTnLst>
-                  <p:par>
-                    <p:cTn id="3" fill="hold">
-                      <p:stCondLst>
-                        <p:cond delay="indefinite"/>
-                      </p:stCondLst>
-                      <p:childTnLst>
-                        <p:par>
-                          <p:cTn id="4" fill="hold">
-                            <p:stCondLst>
-                              <p:cond delay="0"/>
-                            </p:stCondLst>
-                            <p:childTnLst>
-                              <p:par>
-                                <p:cTn id="5" presetID="1" presetClass="entr" presetSubtype="0" fill="hold" nodeType="clickEffect">
-                                  <p:stCondLst>
-                                    <p:cond delay="0"/>
-                                  </p:stCondLst>
-                                  <p:childTnLst>
-                                    <p:set>
-                                      <p:cBhvr>
-                                        <p:cTn id="6" dur="1" fill="hold">
-                                          <p:stCondLst>
-                                            <p:cond delay="0"/>
-                                          </p:stCondLst>
-                                        </p:cTn>
-                                        <p:tgtEl>
-                                          <p:spTgt spid="3">
-                                            <p:txEl>
-                                              <p:pRg st="1" end="1"/>
-                                            </p:txEl>
-                                          </p:spTgt>
-                                        </p:tgtEl>
-                                        <p:attrNameLst>
-                                          <p:attrName>style.visibility</p:attrName>
-                                        </p:attrNameLst>
-                                      </p:cBhvr>
-                                      <p:to>
-                                        <p:strVal val="visible"/>
-                                      </p:to>
-                                    </p:set>
-                                  </p:childTnLst>
-                                </p:cTn>
-                              </p:par>
-                              <p:par>
-                                <p:cTn id="7" presetID="1" presetClass="entr" presetSubtype="0" fill="hold" nodeType="withEffect">
-                                  <p:stCondLst>
-                                    <p:cond delay="0"/>
-                                  </p:stCondLst>
-                                  <p:childTnLst>
-                                    <p:set>
-                                      <p:cBhvr>
-                                        <p:cTn id="8" dur="1" fill="hold">
-                                          <p:stCondLst>
-                                            <p:cond delay="0"/>
-                                          </p:stCondLst>
-                                        </p:cTn>
-                                        <p:tgtEl>
-                                          <p:spTgt spid="6"/>
-                                        </p:tgtEl>
-                                        <p:attrNameLst>
-                                          <p:attrName>style.visibility</p:attrName>
-                                        </p:attrNameLst>
-                                      </p:cBhvr>
-                                      <p:to>
-                                        <p:strVal val="visible"/>
-                                      </p:to>
-                                    </p:set>
-                                  </p:childTnLst>
-                                </p:cTn>
-                              </p:par>
-                            </p:childTnLst>
-                          </p:cTn>
-                        </p:par>
-                      </p:childTnLst>
-                    </p:cTn>
-                  </p:par>
-                  <p:par>
-                    <p:cTn id="9" fill="hold">
-                      <p:stCondLst>
-                        <p:cond delay="indefinite"/>
-                      </p:stCondLst>
-                      <p:childTnLst>
-                        <p:par>
-                          <p:cTn id="10" fill="hold">
-                            <p:stCondLst>
-                              <p:cond delay="0"/>
-                            </p:stCondLst>
-                            <p:childTnLst>
-                              <p:par>
-                                <p:cTn id="11" presetID="1" presetClass="entr" presetSubtype="0" fill="hold" nodeType="clickEffect">
-                                  <p:stCondLst>
-                                    <p:cond delay="0"/>
-                                  </p:stCondLst>
-                                  <p:childTnLst>
-                                    <p:set>
-                                      <p:cBhvr>
-                                        <p:cTn id="12" dur="1" fill="hold">
-                                          <p:stCondLst>
-                                            <p:cond delay="0"/>
-                                          </p:stCondLst>
-                                        </p:cTn>
-                                        <p:tgtEl>
-                                          <p:spTgt spid="3">
-                                            <p:txEl>
-                                              <p:pRg st="3" end="3"/>
-                                            </p:txEl>
-                                          </p:spTgt>
-                                        </p:tgtEl>
-                                        <p:attrNameLst>
-                                          <p:attrName>style.visibility</p:attrName>
-                                        </p:attrNameLst>
-                                      </p:cBhvr>
-                                      <p:to>
-                                        <p:strVal val="visible"/>
-                                      </p:to>
-                                    </p:set>
-                                  </p:childTnLst>
-                                </p:cTn>
-                              </p:par>
-                            </p:childTnLst>
-                          </p:cTn>
-                        </p:par>
-                      </p:childTnLst>
-                    </p:cTn>
-                  </p:par>
-                  <p:par>
-                    <p:cTn id="13" fill="hold">
-                      <p:stCondLst>
-                        <p:cond delay="indefinite"/>
-                      </p:stCondLst>
-                      <p:childTnLst>
-                        <p:par>
-                          <p:cTn id="14" fill="hold">
-                            <p:stCondLst>
-                              <p:cond delay="0"/>
-                            </p:stCondLst>
-                            <p:childTnLst>
-                              <p:par>
-                                <p:cTn id="15" presetID="1" presetClass="entr" presetSubtype="0" fill="hold" nodeType="clickEffect">
-                                  <p:stCondLst>
-                                    <p:cond delay="0"/>
-                                  </p:stCondLst>
-                                  <p:childTnLst>
-                                    <p:set>
-                                      <p:cBhvr>
-                                        <p:cTn id="16" dur="1" fill="hold">
-                                          <p:stCondLst>
-                                            <p:cond delay="0"/>
-                                          </p:stCondLst>
-                                        </p:cTn>
-                                        <p:tgtEl>
-                                          <p:spTgt spid="3">
-                                            <p:txEl>
-                                              <p:pRg st="4" end="4"/>
-                                            </p:txEl>
-                                          </p:spTgt>
-                                        </p:tgtEl>
-                                        <p:attrNameLst>
-                                          <p:attrName>style.visibility</p:attrName>
-                                        </p:attrNameLst>
-                                      </p:cBhvr>
-                                      <p:to>
-                                        <p:strVal val="visible"/>
-                                      </p:to>
-                                    </p:set>
-                                  </p:childTnLst>
-                                </p:cTn>
-                              </p:par>
-                            </p:childTnLst>
-                          </p:cTn>
-                        </p:par>
-                      </p:childTnLst>
-                    </p:cTn>
-                  </p:par>
-                  <p:par>
-                    <p:cTn id="17" fill="hold">
-                      <p:stCondLst>
-                        <p:cond delay="indefinite"/>
-                      </p:stCondLst>
-                      <p:childTnLst>
-                        <p:par>
-                          <p:cTn id="18" fill="hold">
-                            <p:stCondLst>
-                              <p:cond delay="0"/>
-                            </p:stCondLst>
-                            <p:childTnLst>
-                              <p:par>
-                                <p:cTn id="19" presetID="1" presetClass="entr" presetSubtype="0" fill="hold" nodeType="clickEffect">
-                                  <p:stCondLst>
-                                    <p:cond delay="0"/>
-                                  </p:stCondLst>
-                                  <p:childTnLst>
-                                    <p:set>
-                                      <p:cBhvr>
-                                        <p:cTn id="20" dur="1" fill="hold">
-                                          <p:stCondLst>
-                                            <p:cond delay="0"/>
-                                          </p:stCondLst>
-                                        </p:cTn>
-                                        <p:tgtEl>
-                                          <p:spTgt spid="3">
-                                            <p:txEl>
-                                              <p:pRg st="5" end="5"/>
-                                            </p:txEl>
-                                          </p:spTgt>
-                                        </p:tgtEl>
-                                        <p:attrNameLst>
-                                          <p:attrName>style.visibility</p:attrName>
-                                        </p:attrNameLst>
-                                      </p:cBhvr>
-                                      <p:to>
-                                        <p:strVal val="visible"/>
-                                      </p:to>
-                                    </p:set>
-                                  </p:childTnLst>
-                                </p:cTn>
-                              </p:par>
-                            </p:childTnLst>
-                          </p:cTn>
-                        </p:par>
-                      </p:childTnLst>
-                    </p:cTn>
-                  </p:par>
-                  <p:par>
-                    <p:cTn id="21" fill="hold">
-                      <p:stCondLst>
-                        <p:cond delay="indefinite"/>
-                      </p:stCondLst>
-                      <p:childTnLst>
-                        <p:par>
-                          <p:cTn id="22" fill="hold">
-                            <p:stCondLst>
-                              <p:cond delay="0"/>
-                            </p:stCondLst>
-                            <p:childTnLst>
-                              <p:par>
-                                <p:cTn id="23" presetID="1" presetClass="entr" presetSubtype="0" fill="hold" nodeType="clickEffect">
-                                  <p:stCondLst>
-                                    <p:cond delay="0"/>
-                                  </p:stCondLst>
-                                  <p:childTnLst>
-                                    <p:set>
-                                      <p:cBhvr>
-                                        <p:cTn id="24" dur="1" fill="hold">
-                                          <p:stCondLst>
-                                            <p:cond delay="0"/>
-                                          </p:stCondLst>
-                                        </p:cTn>
-                                        <p:tgtEl>
-                                          <p:spTgt spid="3">
-                                            <p:txEl>
-                                              <p:pRg st="6" end="6"/>
-                                            </p:txEl>
-                                          </p:spTgt>
-                                        </p:tgtEl>
-                                        <p:attrNameLst>
-                                          <p:attrName>style.visibility</p:attrName>
-                                        </p:attrNameLst>
-                                      </p:cBhvr>
-                                      <p:to>
-                                        <p:strVal val="visible"/>
-                                      </p:to>
-                                    </p:set>
-                                  </p:childTnLst>
-                                </p:cTn>
-                              </p:par>
-                            </p:childTnLst>
-                          </p:cTn>
-                        </p:par>
-                      </p:childTnLst>
-                    </p:cTn>
-                  </p:par>
-                  <p:par>
-                    <p:cTn id="25" fill="hold">
-                      <p:stCondLst>
-                        <p:cond delay="indefinite"/>
-                      </p:stCondLst>
-                      <p:childTnLst>
-                        <p:par>
-                          <p:cTn id="26" fill="hold">
-                            <p:stCondLst>
-                              <p:cond delay="0"/>
-                            </p:stCondLst>
-                            <p:childTnLst>
-                              <p:par>
-                                <p:cTn id="27" presetID="1" presetClass="entr" presetSubtype="0" fill="hold" nodeType="clickEffect">
-                                  <p:stCondLst>
-                                    <p:cond delay="0"/>
-                                  </p:stCondLst>
-                                  <p:childTnLst>
-                                    <p:set>
-                                      <p:cBhvr>
-                                        <p:cTn id="28" dur="1" fill="hold">
-                                          <p:stCondLst>
-                                            <p:cond delay="0"/>
-                                          </p:stCondLst>
-                                        </p:cTn>
-                                        <p:tgtEl>
-                                          <p:spTgt spid="3">
-                                            <p:txEl>
-                                              <p:pRg st="7" end="7"/>
-                                            </p:txEl>
-                                          </p:spTgt>
-                                        </p:tgtEl>
-                                        <p:attrNameLst>
-                                          <p:attrName>style.visibility</p:attrName>
-                                        </p:attrNameLst>
-                                      </p:cBhvr>
-                                      <p:to>
-                                        <p:strVal val="visible"/>
-                                      </p:to>
-                                    </p:set>
-                                  </p:childTnLst>
-                                </p:cTn>
-                              </p:par>
-                            </p:childTnLst>
-                          </p:cTn>
-                        </p:par>
-                      </p:childTnLst>
-                    </p:cTn>
-                  </p:par>
-                </p:childTnLst>
-              </p:cTn>
-              <p:prevCondLst>
-                <p:cond evt="onPrev" delay="0">
-                  <p:tgtEl>
-                    <p:sldTgt/>
-                  </p:tgtEl>
-                </p:cond>
-              </p:prevCondLst>
-              <p:nextCondLst>
-                <p:cond evt="onNext" delay="0">
-                  <p:tgtEl>
-                    <p:sldTgt/>
-                  </p:tgtEl>
-                </p:cond>
-              </p:nextCondLst>
-            </p:seq>
-          </p:childTnLst>
-        </p:cTn>
-      </p:par>
-    </p:tnLst>
-  </p:timing>
-</p:sld>
-</file>
-
-<file path=ppt/slides/slide21.xml><?xml version="1.0" encoding="utf-8"?>
 <p:sld xmlns:a="http://schemas.openxmlformats.org/drawingml/2006/main" xmlns:r="http://schemas.openxmlformats.org/officeDocument/2006/relationships" xmlns:p="http://schemas.openxmlformats.org/presentationml/2006/main">
   <p:cSld>
     <p:spTree>
@@ -14849,7 +14051,7 @@
 </p:sld>
 </file>
 
-<file path=ppt/slides/slide22.xml><?xml version="1.0" encoding="utf-8"?>
+<file path=ppt/slides/slide21.xml><?xml version="1.0" encoding="utf-8"?>
 <p:sld xmlns:a="http://schemas.openxmlformats.org/drawingml/2006/main" xmlns:r="http://schemas.openxmlformats.org/officeDocument/2006/relationships" xmlns:p="http://schemas.openxmlformats.org/presentationml/2006/main">
   <p:cSld>
     <p:spTree>
@@ -16099,7 +15301,7 @@
 </p:sld>
 </file>
 
-<file path=ppt/slides/slide23.xml><?xml version="1.0" encoding="utf-8"?>
+<file path=ppt/slides/slide22.xml><?xml version="1.0" encoding="utf-8"?>
 <p:sld xmlns:a="http://schemas.openxmlformats.org/drawingml/2006/main" xmlns:r="http://schemas.openxmlformats.org/officeDocument/2006/relationships" xmlns:p="http://schemas.openxmlformats.org/presentationml/2006/main">
   <p:cSld>
     <p:spTree>
@@ -16807,7 +16009,7 @@
 </p:sld>
 </file>
 
-<file path=ppt/slides/slide24.xml><?xml version="1.0" encoding="utf-8"?>
+<file path=ppt/slides/slide23.xml><?xml version="1.0" encoding="utf-8"?>
 <p:sld xmlns:a="http://schemas.openxmlformats.org/drawingml/2006/main" xmlns:r="http://schemas.openxmlformats.org/officeDocument/2006/relationships" xmlns:p="http://schemas.openxmlformats.org/presentationml/2006/main">
   <p:cSld>
     <p:spTree>
@@ -17715,7 +16917,7 @@
 </p:sld>
 </file>
 
-<file path=ppt/slides/slide25.xml><?xml version="1.0" encoding="utf-8"?>
+<file path=ppt/slides/slide24.xml><?xml version="1.0" encoding="utf-8"?>
 <p:sld xmlns:a="http://schemas.openxmlformats.org/drawingml/2006/main" xmlns:r="http://schemas.openxmlformats.org/officeDocument/2006/relationships" xmlns:p="http://schemas.openxmlformats.org/presentationml/2006/main">
   <p:cSld>
     <p:spTree>
@@ -18233,7 +17435,7 @@
 </p:sld>
 </file>
 
-<file path=ppt/slides/slide26.xml><?xml version="1.0" encoding="utf-8"?>
+<file path=ppt/slides/slide25.xml><?xml version="1.0" encoding="utf-8"?>
 <p:sld xmlns:a="http://schemas.openxmlformats.org/drawingml/2006/main" xmlns:r="http://schemas.openxmlformats.org/officeDocument/2006/relationships" xmlns:p="http://schemas.openxmlformats.org/presentationml/2006/main">
   <p:cSld>
     <p:spTree>
@@ -19256,7 +18458,7 @@
 </p:sld>
 </file>
 
-<file path=ppt/slides/slide27.xml><?xml version="1.0" encoding="utf-8"?>
+<file path=ppt/slides/slide26.xml><?xml version="1.0" encoding="utf-8"?>
 <p:sld xmlns:a="http://schemas.openxmlformats.org/drawingml/2006/main" xmlns:r="http://schemas.openxmlformats.org/officeDocument/2006/relationships" xmlns:p="http://schemas.openxmlformats.org/presentationml/2006/main">
   <p:cSld>
     <p:spTree>
@@ -20633,7 +19835,7 @@
 </p:sld>
 </file>
 
-<file path=ppt/slides/slide28.xml><?xml version="1.0" encoding="utf-8"?>
+<file path=ppt/slides/slide27.xml><?xml version="1.0" encoding="utf-8"?>
 <p:sld xmlns:a="http://schemas.openxmlformats.org/drawingml/2006/main" xmlns:r="http://schemas.openxmlformats.org/officeDocument/2006/relationships" xmlns:p="http://schemas.openxmlformats.org/presentationml/2006/main">
   <p:cSld>
     <p:spTree>
@@ -21874,7 +21076,7 @@
 </p:sld>
 </file>
 
-<file path=ppt/slides/slide29.xml><?xml version="1.0" encoding="utf-8"?>
+<file path=ppt/slides/slide28.xml><?xml version="1.0" encoding="utf-8"?>
 <p:sld xmlns:a="http://schemas.openxmlformats.org/drawingml/2006/main" xmlns:r="http://schemas.openxmlformats.org/officeDocument/2006/relationships" xmlns:p="http://schemas.openxmlformats.org/presentationml/2006/main">
   <p:cSld>
     <p:spTree>
@@ -21939,72 +21141,7 @@
 </p:sld>
 </file>
 
-<file path=ppt/slides/slide3.xml><?xml version="1.0" encoding="utf-8"?>
-<p:sld xmlns:a="http://schemas.openxmlformats.org/drawingml/2006/main" xmlns:r="http://schemas.openxmlformats.org/officeDocument/2006/relationships" xmlns:p="http://schemas.openxmlformats.org/presentationml/2006/main">
-  <p:cSld>
-    <p:spTree>
-      <p:nvGrpSpPr>
-        <p:cNvPr id="1" name=""/>
-        <p:cNvGrpSpPr/>
-        <p:nvPr/>
-      </p:nvGrpSpPr>
-      <p:grpSpPr>
-        <a:xfrm>
-          <a:off x="0" y="0"/>
-          <a:ext cx="0" cy="0"/>
-          <a:chOff x="0" y="0"/>
-          <a:chExt cx="0" cy="0"/>
-        </a:xfrm>
-      </p:grpSpPr>
-      <p:sp>
-        <p:nvSpPr>
-          <p:cNvPr id="2" name="Subtitle 1">
-            <a:extLst>
-              <a:ext uri="{FF2B5EF4-FFF2-40B4-BE49-F238E27FC236}">
-                <a16:creationId xmlns:a16="http://schemas.microsoft.com/office/drawing/2014/main" id="{72B41D70-8836-483A-8138-BCB7A352D451}"/>
-              </a:ext>
-            </a:extLst>
-          </p:cNvPr>
-          <p:cNvSpPr>
-            <a:spLocks noGrp="1"/>
-          </p:cNvSpPr>
-          <p:nvPr>
-            <p:ph type="subTitle" idx="1"/>
-          </p:nvPr>
-        </p:nvSpPr>
-        <p:spPr>
-          <a:xfrm>
-            <a:off x="1485165" y="1784284"/>
-            <a:ext cx="9685343" cy="2015419"/>
-          </a:xfrm>
-        </p:spPr>
-        <p:txBody>
-          <a:bodyPr>
-            <a:normAutofit/>
-          </a:bodyPr>
-          <a:lstStyle/>
-          <a:p>
-            <a:r>
-              <a:rPr lang="en-US" sz="4400" b="1" dirty="0"/>
-              <a:t>Quadratic Optimization and Gradient Descent</a:t>
-            </a:r>
-          </a:p>
-        </p:txBody>
-      </p:sp>
-    </p:spTree>
-    <p:extLst>
-      <p:ext uri="{BB962C8B-B14F-4D97-AF65-F5344CB8AC3E}">
-        <p14:creationId xmlns:p14="http://schemas.microsoft.com/office/powerpoint/2010/main" val="3010856572"/>
-      </p:ext>
-    </p:extLst>
-  </p:cSld>
-  <p:clrMapOvr>
-    <a:masterClrMapping/>
-  </p:clrMapOvr>
-</p:sld>
-</file>
-
-<file path=ppt/slides/slide30.xml><?xml version="1.0" encoding="utf-8"?>
+<file path=ppt/slides/slide29.xml><?xml version="1.0" encoding="utf-8"?>
 <p:sld xmlns:a="http://schemas.openxmlformats.org/drawingml/2006/main" xmlns:r="http://schemas.openxmlformats.org/officeDocument/2006/relationships" xmlns:p="http://schemas.openxmlformats.org/presentationml/2006/main">
   <p:cSld>
     <p:spTree>
@@ -22853,7 +21990,72 @@
 </p:sld>
 </file>
 
-<file path=ppt/slides/slide31.xml><?xml version="1.0" encoding="utf-8"?>
+<file path=ppt/slides/slide3.xml><?xml version="1.0" encoding="utf-8"?>
+<p:sld xmlns:a="http://schemas.openxmlformats.org/drawingml/2006/main" xmlns:r="http://schemas.openxmlformats.org/officeDocument/2006/relationships" xmlns:p="http://schemas.openxmlformats.org/presentationml/2006/main">
+  <p:cSld>
+    <p:spTree>
+      <p:nvGrpSpPr>
+        <p:cNvPr id="1" name=""/>
+        <p:cNvGrpSpPr/>
+        <p:nvPr/>
+      </p:nvGrpSpPr>
+      <p:grpSpPr>
+        <a:xfrm>
+          <a:off x="0" y="0"/>
+          <a:ext cx="0" cy="0"/>
+          <a:chOff x="0" y="0"/>
+          <a:chExt cx="0" cy="0"/>
+        </a:xfrm>
+      </p:grpSpPr>
+      <p:sp>
+        <p:nvSpPr>
+          <p:cNvPr id="2" name="Subtitle 1">
+            <a:extLst>
+              <a:ext uri="{FF2B5EF4-FFF2-40B4-BE49-F238E27FC236}">
+                <a16:creationId xmlns:a16="http://schemas.microsoft.com/office/drawing/2014/main" id="{72B41D70-8836-483A-8138-BCB7A352D451}"/>
+              </a:ext>
+            </a:extLst>
+          </p:cNvPr>
+          <p:cNvSpPr>
+            <a:spLocks noGrp="1"/>
+          </p:cNvSpPr>
+          <p:nvPr>
+            <p:ph type="subTitle" idx="1"/>
+          </p:nvPr>
+        </p:nvSpPr>
+        <p:spPr>
+          <a:xfrm>
+            <a:off x="1485165" y="1784284"/>
+            <a:ext cx="9685343" cy="2015419"/>
+          </a:xfrm>
+        </p:spPr>
+        <p:txBody>
+          <a:bodyPr>
+            <a:normAutofit/>
+          </a:bodyPr>
+          <a:lstStyle/>
+          <a:p>
+            <a:r>
+              <a:rPr lang="en-US" sz="4400" b="1" dirty="0"/>
+              <a:t>Quadratic Optimization and Gradient Descent</a:t>
+            </a:r>
+          </a:p>
+        </p:txBody>
+      </p:sp>
+    </p:spTree>
+    <p:extLst>
+      <p:ext uri="{BB962C8B-B14F-4D97-AF65-F5344CB8AC3E}">
+        <p14:creationId xmlns:p14="http://schemas.microsoft.com/office/powerpoint/2010/main" val="3010856572"/>
+      </p:ext>
+    </p:extLst>
+  </p:cSld>
+  <p:clrMapOvr>
+    <a:masterClrMapping/>
+  </p:clrMapOvr>
+</p:sld>
+</file>
+
+<file path=ppt/slides/slide30.xml><?xml version="1.0" encoding="utf-8"?>
 <p:sld xmlns:a="http://schemas.openxmlformats.org/drawingml/2006/main" xmlns:r="http://schemas.openxmlformats.org/officeDocument/2006/relationships" xmlns:p="http://schemas.openxmlformats.org/presentationml/2006/main">
   <p:cSld>
     <p:spTree>
@@ -23475,7 +22677,7 @@
 </p:sld>
 </file>
 
-<file path=ppt/slides/slide32.xml><?xml version="1.0" encoding="utf-8"?>
+<file path=ppt/slides/slide31.xml><?xml version="1.0" encoding="utf-8"?>
 <p:sld xmlns:a="http://schemas.openxmlformats.org/drawingml/2006/main" xmlns:r="http://schemas.openxmlformats.org/officeDocument/2006/relationships" xmlns:p="http://schemas.openxmlformats.org/presentationml/2006/main">
   <p:cSld>
     <p:spTree>
@@ -23540,7 +22742,7 @@
 </p:sld>
 </file>
 
-<file path=ppt/slides/slide33.xml><?xml version="1.0" encoding="utf-8"?>
+<file path=ppt/slides/slide32.xml><?xml version="1.0" encoding="utf-8"?>
 <p:sld xmlns:a="http://schemas.openxmlformats.org/drawingml/2006/main" xmlns:r="http://schemas.openxmlformats.org/officeDocument/2006/relationships" xmlns:p="http://schemas.openxmlformats.org/presentationml/2006/main">
   <p:cSld>
     <p:spTree>
@@ -23878,7 +23080,14 @@
                 <a:latin typeface="Segoe UI" panose="020B0502040204020203" pitchFamily="34" charset="0"/>
                 <a:cs typeface="Segoe UI" panose="020B0502040204020203" pitchFamily="34" charset="0"/>
               </a:rPr>
-              <a:t>                is the Bernoulli sampled mini-batch</a:t>
+              <a:t>                is the Bernoulli sampled </a:t>
+            </a:r>
+            <a:r>
+              <a:rPr lang="en-US" b="1" dirty="0">
+                <a:latin typeface="Segoe UI" panose="020B0502040204020203" pitchFamily="34" charset="0"/>
+                <a:cs typeface="Segoe UI" panose="020B0502040204020203" pitchFamily="34" charset="0"/>
+              </a:rPr>
+              <a:t>mini-batch</a:t>
             </a:r>
           </a:p>
           <a:p>
@@ -23890,7 +23099,21 @@
                 <a:latin typeface="Segoe UI" panose="020B0502040204020203" pitchFamily="34" charset="0"/>
                 <a:cs typeface="Segoe UI" panose="020B0502040204020203" pitchFamily="34" charset="0"/>
               </a:rPr>
-              <a:t>                 is the expected value of the gradient given the Bernoulli</a:t>
+              <a:t>                 is the </a:t>
+            </a:r>
+            <a:r>
+              <a:rPr lang="en-US" b="1" dirty="0">
+                <a:latin typeface="Segoe UI" panose="020B0502040204020203" pitchFamily="34" charset="0"/>
+                <a:cs typeface="Segoe UI" panose="020B0502040204020203" pitchFamily="34" charset="0"/>
+              </a:rPr>
+              <a:t>expected value of the gradient </a:t>
+            </a:r>
+            <a:r>
+              <a:rPr lang="en-US" dirty="0">
+                <a:latin typeface="Segoe UI" panose="020B0502040204020203" pitchFamily="34" charset="0"/>
+                <a:cs typeface="Segoe UI" panose="020B0502040204020203" pitchFamily="34" charset="0"/>
+              </a:rPr>
+              <a:t>given the Bernoulli</a:t>
             </a:r>
           </a:p>
           <a:p>
@@ -24438,7 +23661,7 @@
 </p:sld>
 </file>
 
-<file path=ppt/slides/slide34.xml><?xml version="1.0" encoding="utf-8"?>
+<file path=ppt/slides/slide33.xml><?xml version="1.0" encoding="utf-8"?>
 <p:sld xmlns:a="http://schemas.openxmlformats.org/drawingml/2006/main" xmlns:r="http://schemas.openxmlformats.org/officeDocument/2006/relationships" xmlns:p="http://schemas.openxmlformats.org/presentationml/2006/main">
   <p:cSld>
     <p:spTree>
@@ -24883,7 +24106,7 @@
 </p:sld>
 </file>
 
-<file path=ppt/slides/slide35.xml><?xml version="1.0" encoding="utf-8"?>
+<file path=ppt/slides/slide34.xml><?xml version="1.0" encoding="utf-8"?>
 <p:sld xmlns:a="http://schemas.openxmlformats.org/drawingml/2006/main" xmlns:r="http://schemas.openxmlformats.org/officeDocument/2006/relationships" xmlns:p="http://schemas.openxmlformats.org/presentationml/2006/main">
   <p:cSld>
     <p:spTree>
@@ -25670,7 +24893,7 @@
 </p:sld>
 </file>
 
-<file path=ppt/slides/slide36.xml><?xml version="1.0" encoding="utf-8"?>
+<file path=ppt/slides/slide35.xml><?xml version="1.0" encoding="utf-8"?>
 <p:sld xmlns:a="http://schemas.openxmlformats.org/drawingml/2006/main" xmlns:r="http://schemas.openxmlformats.org/officeDocument/2006/relationships" xmlns:p="http://schemas.openxmlformats.org/presentationml/2006/main">
   <p:cSld>
     <p:spTree>
@@ -25735,7 +24958,7 @@
 </p:sld>
 </file>
 
-<file path=ppt/slides/slide37.xml><?xml version="1.0" encoding="utf-8"?>
+<file path=ppt/slides/slide36.xml><?xml version="1.0" encoding="utf-8"?>
 <p:sld xmlns:a="http://schemas.openxmlformats.org/drawingml/2006/main" xmlns:r="http://schemas.openxmlformats.org/officeDocument/2006/relationships" xmlns:p="http://schemas.openxmlformats.org/presentationml/2006/main">
   <p:cSld>
     <p:spTree>
@@ -26441,7 +25664,7 @@
 </p:sld>
 </file>
 
-<file path=ppt/slides/slide38.xml><?xml version="1.0" encoding="utf-8"?>
+<file path=ppt/slides/slide37.xml><?xml version="1.0" encoding="utf-8"?>
 <p:sld xmlns:a="http://schemas.openxmlformats.org/drawingml/2006/main" xmlns:r="http://schemas.openxmlformats.org/officeDocument/2006/relationships" xmlns:p="http://schemas.openxmlformats.org/presentationml/2006/main">
   <p:cSld>
     <p:spTree>
@@ -27394,7 +26617,7 @@
 </p:sld>
 </file>
 
-<file path=ppt/slides/slide39.xml><?xml version="1.0" encoding="utf-8"?>
+<file path=ppt/slides/slide38.xml><?xml version="1.0" encoding="utf-8"?>
 <p:sld xmlns:a="http://schemas.openxmlformats.org/drawingml/2006/main" xmlns:r="http://schemas.openxmlformats.org/officeDocument/2006/relationships" xmlns:p="http://schemas.openxmlformats.org/presentationml/2006/main">
   <p:cSld>
     <p:spTree>
@@ -27957,6 +27180,521 @@
                                           <p:spTgt spid="3">
                                             <p:txEl>
                                               <p:pRg st="7" end="7"/>
+                                            </p:txEl>
+                                          </p:spTgt>
+                                        </p:tgtEl>
+                                        <p:attrNameLst>
+                                          <p:attrName>style.visibility</p:attrName>
+                                        </p:attrNameLst>
+                                      </p:cBhvr>
+                                      <p:to>
+                                        <p:strVal val="visible"/>
+                                      </p:to>
+                                    </p:set>
+                                  </p:childTnLst>
+                                </p:cTn>
+                              </p:par>
+                            </p:childTnLst>
+                          </p:cTn>
+                        </p:par>
+                      </p:childTnLst>
+                    </p:cTn>
+                  </p:par>
+                </p:childTnLst>
+              </p:cTn>
+              <p:prevCondLst>
+                <p:cond evt="onPrev" delay="0">
+                  <p:tgtEl>
+                    <p:sldTgt/>
+                  </p:tgtEl>
+                </p:cond>
+              </p:prevCondLst>
+              <p:nextCondLst>
+                <p:cond evt="onNext" delay="0">
+                  <p:tgtEl>
+                    <p:sldTgt/>
+                  </p:tgtEl>
+                </p:cond>
+              </p:nextCondLst>
+            </p:seq>
+          </p:childTnLst>
+        </p:cTn>
+      </p:par>
+    </p:tnLst>
+    <p:bldLst>
+      <p:bldP spid="3" grpId="0" uiExpand="1" build="p"/>
+    </p:bldLst>
+  </p:timing>
+</p:sld>
+</file>
+
+<file path=ppt/slides/slide39.xml><?xml version="1.0" encoding="utf-8"?>
+<p:sld xmlns:a="http://schemas.openxmlformats.org/drawingml/2006/main" xmlns:r="http://schemas.openxmlformats.org/officeDocument/2006/relationships" xmlns:p="http://schemas.openxmlformats.org/presentationml/2006/main">
+  <p:cSld>
+    <p:spTree>
+      <p:nvGrpSpPr>
+        <p:cNvPr id="1" name=""/>
+        <p:cNvGrpSpPr/>
+        <p:nvPr/>
+      </p:nvGrpSpPr>
+      <p:grpSpPr>
+        <a:xfrm>
+          <a:off x="0" y="0"/>
+          <a:ext cx="0" cy="0"/>
+          <a:chOff x="0" y="0"/>
+          <a:chExt cx="0" cy="0"/>
+        </a:xfrm>
+      </p:grpSpPr>
+      <p:sp>
+        <p:nvSpPr>
+          <p:cNvPr id="2" name="Title 1">
+            <a:extLst>
+              <a:ext uri="{FF2B5EF4-FFF2-40B4-BE49-F238E27FC236}">
+                <a16:creationId xmlns:a16="http://schemas.microsoft.com/office/drawing/2014/main" id="{93AA26DA-9EBE-4A51-845C-B0968922BA9B}"/>
+              </a:ext>
+            </a:extLst>
+          </p:cNvPr>
+          <p:cNvSpPr>
+            <a:spLocks noGrp="1"/>
+          </p:cNvSpPr>
+          <p:nvPr>
+            <p:ph type="title"/>
+          </p:nvPr>
+        </p:nvSpPr>
+        <p:spPr>
+          <a:xfrm>
+            <a:off x="379514" y="182216"/>
+            <a:ext cx="11524432" cy="663604"/>
+          </a:xfrm>
+        </p:spPr>
+        <p:txBody>
+          <a:bodyPr>
+            <a:normAutofit/>
+          </a:bodyPr>
+          <a:lstStyle/>
+          <a:p>
+            <a:r>
+              <a:rPr lang="en-US" dirty="0">
+                <a:latin typeface="Segoe UI" panose="020B0502040204020203" pitchFamily="34" charset="0"/>
+                <a:cs typeface="Segoe UI" panose="020B0502040204020203" pitchFamily="34" charset="0"/>
+              </a:rPr>
+              <a:t>Selecting Initial Weight Values</a:t>
+            </a:r>
+          </a:p>
+        </p:txBody>
+      </p:sp>
+      <p:sp>
+        <p:nvSpPr>
+          <p:cNvPr id="3" name="Content Placeholder 2">
+            <a:extLst>
+              <a:ext uri="{FF2B5EF4-FFF2-40B4-BE49-F238E27FC236}">
+                <a16:creationId xmlns:a16="http://schemas.microsoft.com/office/drawing/2014/main" id="{FB861F63-F6C3-45B7-B4A8-9B2C4F00C8DF}"/>
+              </a:ext>
+            </a:extLst>
+          </p:cNvPr>
+          <p:cNvSpPr>
+            <a:spLocks noGrp="1"/>
+          </p:cNvSpPr>
+          <p:nvPr>
+            <p:ph sz="quarter" idx="10"/>
+          </p:nvPr>
+        </p:nvSpPr>
+        <p:spPr>
+          <a:xfrm>
+            <a:off x="424815" y="902970"/>
+            <a:ext cx="11525250" cy="5303520"/>
+          </a:xfrm>
+        </p:spPr>
+        <p:txBody>
+          <a:bodyPr/>
+          <a:lstStyle/>
+          <a:p>
+            <a:r>
+              <a:rPr lang="en-US" sz="2800" dirty="0">
+                <a:latin typeface="Segoe UI" panose="020B0502040204020203" pitchFamily="34" charset="0"/>
+                <a:cs typeface="Segoe UI" panose="020B0502040204020203" pitchFamily="34" charset="0"/>
+              </a:rPr>
+              <a:t>To prevent weights from becoming linearly dependent the </a:t>
+            </a:r>
+            <a:r>
+              <a:rPr lang="en-US" sz="2800" b="1" dirty="0">
+                <a:latin typeface="Segoe UI" panose="020B0502040204020203" pitchFamily="34" charset="0"/>
+                <a:cs typeface="Segoe UI" panose="020B0502040204020203" pitchFamily="34" charset="0"/>
+              </a:rPr>
+              <a:t>initial values must be randomly selected</a:t>
+            </a:r>
+          </a:p>
+          <a:p>
+            <a:pPr lvl="1">
+              <a:buFont typeface="Wingdings" panose="05000000000000000000" pitchFamily="2" charset="2"/>
+              <a:buChar char="§"/>
+            </a:pPr>
+            <a:r>
+              <a:rPr lang="en-US" sz="2400" dirty="0">
+                <a:latin typeface="Segoe UI" panose="020B0502040204020203" pitchFamily="34" charset="0"/>
+                <a:cs typeface="Segoe UI" panose="020B0502040204020203" pitchFamily="34" charset="0"/>
+              </a:rPr>
+              <a:t>Otherwise, some weight values are never learned</a:t>
+            </a:r>
+          </a:p>
+          <a:p>
+            <a:r>
+              <a:rPr lang="en-US" sz="2800" dirty="0">
+                <a:latin typeface="Segoe UI" panose="020B0502040204020203" pitchFamily="34" charset="0"/>
+                <a:cs typeface="Segoe UI" panose="020B0502040204020203" pitchFamily="34" charset="0"/>
+              </a:rPr>
+              <a:t>Simple truncated Gaussian or Uniform distributed values work well in practice</a:t>
+            </a:r>
+          </a:p>
+          <a:p>
+            <a:pPr lvl="1">
+              <a:buFont typeface="Wingdings" panose="05000000000000000000" pitchFamily="2" charset="2"/>
+              <a:buChar char="§"/>
+            </a:pPr>
+            <a:r>
+              <a:rPr lang="en-US" sz="2400" dirty="0">
+                <a:latin typeface="Segoe UI" panose="020B0502040204020203" pitchFamily="34" charset="0"/>
+                <a:cs typeface="Segoe UI" panose="020B0502040204020203" pitchFamily="34" charset="0"/>
+              </a:rPr>
+              <a:t>This process is referred as adding </a:t>
+            </a:r>
+            <a:r>
+              <a:rPr lang="en-US" sz="2400" b="1" dirty="0">
+                <a:latin typeface="Segoe UI" panose="020B0502040204020203" pitchFamily="34" charset="0"/>
+                <a:cs typeface="Segoe UI" panose="020B0502040204020203" pitchFamily="34" charset="0"/>
+              </a:rPr>
+              <a:t>fuzz</a:t>
+            </a:r>
+            <a:r>
+              <a:rPr lang="en-US" sz="2400" dirty="0">
+                <a:latin typeface="Segoe UI" panose="020B0502040204020203" pitchFamily="34" charset="0"/>
+                <a:cs typeface="Segoe UI" panose="020B0502040204020203" pitchFamily="34" charset="0"/>
+              </a:rPr>
+              <a:t> to the initial values</a:t>
+            </a:r>
+          </a:p>
+          <a:p>
+            <a:pPr>
+              <a:buFont typeface="Wingdings" panose="05000000000000000000" pitchFamily="2" charset="2"/>
+              <a:buChar char="§"/>
+            </a:pPr>
+            <a:r>
+              <a:rPr lang="en-US" sz="2800" dirty="0">
+                <a:latin typeface="Segoe UI" panose="020B0502040204020203" pitchFamily="34" charset="0"/>
+                <a:cs typeface="Segoe UI" panose="020B0502040204020203" pitchFamily="34" charset="0"/>
+              </a:rPr>
+              <a:t>Many other initialization schemes have been developed</a:t>
+            </a:r>
+          </a:p>
+          <a:p>
+            <a:pPr lvl="1">
+              <a:buFont typeface="Wingdings" panose="05000000000000000000" pitchFamily="2" charset="2"/>
+              <a:buChar char="§"/>
+            </a:pPr>
+            <a:r>
+              <a:rPr lang="en-US" sz="2400" dirty="0">
+                <a:latin typeface="Segoe UI" panose="020B0502040204020203" pitchFamily="34" charset="0"/>
+                <a:cs typeface="Segoe UI" panose="020B0502040204020203" pitchFamily="34" charset="0"/>
+              </a:rPr>
+              <a:t>For example, see the </a:t>
+            </a:r>
+            <a:r>
+              <a:rPr lang="en-US" sz="2400" dirty="0" err="1">
+                <a:latin typeface="Segoe UI" panose="020B0502040204020203" pitchFamily="34" charset="0"/>
+                <a:cs typeface="Segoe UI" panose="020B0502040204020203" pitchFamily="34" charset="0"/>
+                <a:hlinkClick r:id="rId2"/>
+              </a:rPr>
+              <a:t>Keras</a:t>
+            </a:r>
+            <a:r>
+              <a:rPr lang="en-US" sz="2400" dirty="0">
+                <a:latin typeface="Segoe UI" panose="020B0502040204020203" pitchFamily="34" charset="0"/>
+                <a:cs typeface="Segoe UI" panose="020B0502040204020203" pitchFamily="34" charset="0"/>
+                <a:hlinkClick r:id="rId2"/>
+              </a:rPr>
+              <a:t> initializers documentation</a:t>
+            </a:r>
+            <a:endParaRPr lang="en-US" sz="2400" dirty="0">
+              <a:latin typeface="Segoe UI" panose="020B0502040204020203" pitchFamily="34" charset="0"/>
+              <a:cs typeface="Segoe UI" panose="020B0502040204020203" pitchFamily="34" charset="0"/>
+            </a:endParaRPr>
+          </a:p>
+        </p:txBody>
+      </p:sp>
+    </p:spTree>
+    <p:extLst>
+      <p:ext uri="{BB962C8B-B14F-4D97-AF65-F5344CB8AC3E}">
+        <p14:creationId xmlns:p14="http://schemas.microsoft.com/office/powerpoint/2010/main" val="1342241391"/>
+      </p:ext>
+    </p:extLst>
+  </p:cSld>
+  <p:clrMapOvr>
+    <a:masterClrMapping/>
+  </p:clrMapOvr>
+  <p:timing>
+    <p:tnLst>
+      <p:par>
+        <p:cTn id="1" dur="indefinite" restart="never" nodeType="tmRoot">
+          <p:childTnLst>
+            <p:seq concurrent="1" nextAc="seek">
+              <p:cTn id="2" dur="indefinite" nodeType="mainSeq">
+                <p:childTnLst>
+                  <p:par>
+                    <p:cTn id="3" fill="hold">
+                      <p:stCondLst>
+                        <p:cond delay="indefinite"/>
+                      </p:stCondLst>
+                      <p:childTnLst>
+                        <p:par>
+                          <p:cTn id="4" fill="hold">
+                            <p:stCondLst>
+                              <p:cond delay="0"/>
+                            </p:stCondLst>
+                            <p:childTnLst>
+                              <p:par>
+                                <p:cTn id="5" presetID="1" presetClass="entr" presetSubtype="0" fill="hold" grpId="0" nodeType="clickEffect">
+                                  <p:stCondLst>
+                                    <p:cond delay="0"/>
+                                  </p:stCondLst>
+                                  <p:childTnLst>
+                                    <p:set>
+                                      <p:cBhvr>
+                                        <p:cTn id="6" dur="1" fill="hold">
+                                          <p:stCondLst>
+                                            <p:cond delay="0"/>
+                                          </p:stCondLst>
+                                        </p:cTn>
+                                        <p:tgtEl>
+                                          <p:spTgt spid="3">
+                                            <p:txEl>
+                                              <p:pRg st="0" end="0"/>
+                                            </p:txEl>
+                                          </p:spTgt>
+                                        </p:tgtEl>
+                                        <p:attrNameLst>
+                                          <p:attrName>style.visibility</p:attrName>
+                                        </p:attrNameLst>
+                                      </p:cBhvr>
+                                      <p:to>
+                                        <p:strVal val="visible"/>
+                                      </p:to>
+                                    </p:set>
+                                  </p:childTnLst>
+                                </p:cTn>
+                              </p:par>
+                            </p:childTnLst>
+                          </p:cTn>
+                        </p:par>
+                      </p:childTnLst>
+                    </p:cTn>
+                  </p:par>
+                  <p:par>
+                    <p:cTn id="7" fill="hold">
+                      <p:stCondLst>
+                        <p:cond delay="indefinite"/>
+                      </p:stCondLst>
+                      <p:childTnLst>
+                        <p:par>
+                          <p:cTn id="8" fill="hold">
+                            <p:stCondLst>
+                              <p:cond delay="0"/>
+                            </p:stCondLst>
+                            <p:childTnLst>
+                              <p:par>
+                                <p:cTn id="9" presetID="1" presetClass="entr" presetSubtype="0" fill="hold" grpId="0" nodeType="clickEffect">
+                                  <p:stCondLst>
+                                    <p:cond delay="0"/>
+                                  </p:stCondLst>
+                                  <p:childTnLst>
+                                    <p:set>
+                                      <p:cBhvr>
+                                        <p:cTn id="10" dur="1" fill="hold">
+                                          <p:stCondLst>
+                                            <p:cond delay="0"/>
+                                          </p:stCondLst>
+                                        </p:cTn>
+                                        <p:tgtEl>
+                                          <p:spTgt spid="3">
+                                            <p:txEl>
+                                              <p:pRg st="1" end="1"/>
+                                            </p:txEl>
+                                          </p:spTgt>
+                                        </p:tgtEl>
+                                        <p:attrNameLst>
+                                          <p:attrName>style.visibility</p:attrName>
+                                        </p:attrNameLst>
+                                      </p:cBhvr>
+                                      <p:to>
+                                        <p:strVal val="visible"/>
+                                      </p:to>
+                                    </p:set>
+                                  </p:childTnLst>
+                                </p:cTn>
+                              </p:par>
+                            </p:childTnLst>
+                          </p:cTn>
+                        </p:par>
+                      </p:childTnLst>
+                    </p:cTn>
+                  </p:par>
+                  <p:par>
+                    <p:cTn id="11" fill="hold">
+                      <p:stCondLst>
+                        <p:cond delay="indefinite"/>
+                      </p:stCondLst>
+                      <p:childTnLst>
+                        <p:par>
+                          <p:cTn id="12" fill="hold">
+                            <p:stCondLst>
+                              <p:cond delay="0"/>
+                            </p:stCondLst>
+                            <p:childTnLst>
+                              <p:par>
+                                <p:cTn id="13" presetID="1" presetClass="entr" presetSubtype="0" fill="hold" grpId="0" nodeType="clickEffect">
+                                  <p:stCondLst>
+                                    <p:cond delay="0"/>
+                                  </p:stCondLst>
+                                  <p:childTnLst>
+                                    <p:set>
+                                      <p:cBhvr>
+                                        <p:cTn id="14" dur="1" fill="hold">
+                                          <p:stCondLst>
+                                            <p:cond delay="0"/>
+                                          </p:stCondLst>
+                                        </p:cTn>
+                                        <p:tgtEl>
+                                          <p:spTgt spid="3">
+                                            <p:txEl>
+                                              <p:pRg st="2" end="2"/>
+                                            </p:txEl>
+                                          </p:spTgt>
+                                        </p:tgtEl>
+                                        <p:attrNameLst>
+                                          <p:attrName>style.visibility</p:attrName>
+                                        </p:attrNameLst>
+                                      </p:cBhvr>
+                                      <p:to>
+                                        <p:strVal val="visible"/>
+                                      </p:to>
+                                    </p:set>
+                                  </p:childTnLst>
+                                </p:cTn>
+                              </p:par>
+                            </p:childTnLst>
+                          </p:cTn>
+                        </p:par>
+                      </p:childTnLst>
+                    </p:cTn>
+                  </p:par>
+                  <p:par>
+                    <p:cTn id="15" fill="hold">
+                      <p:stCondLst>
+                        <p:cond delay="indefinite"/>
+                      </p:stCondLst>
+                      <p:childTnLst>
+                        <p:par>
+                          <p:cTn id="16" fill="hold">
+                            <p:stCondLst>
+                              <p:cond delay="0"/>
+                            </p:stCondLst>
+                            <p:childTnLst>
+                              <p:par>
+                                <p:cTn id="17" presetID="1" presetClass="entr" presetSubtype="0" fill="hold" grpId="0" nodeType="clickEffect">
+                                  <p:stCondLst>
+                                    <p:cond delay="0"/>
+                                  </p:stCondLst>
+                                  <p:childTnLst>
+                                    <p:set>
+                                      <p:cBhvr>
+                                        <p:cTn id="18" dur="1" fill="hold">
+                                          <p:stCondLst>
+                                            <p:cond delay="0"/>
+                                          </p:stCondLst>
+                                        </p:cTn>
+                                        <p:tgtEl>
+                                          <p:spTgt spid="3">
+                                            <p:txEl>
+                                              <p:pRg st="3" end="3"/>
+                                            </p:txEl>
+                                          </p:spTgt>
+                                        </p:tgtEl>
+                                        <p:attrNameLst>
+                                          <p:attrName>style.visibility</p:attrName>
+                                        </p:attrNameLst>
+                                      </p:cBhvr>
+                                      <p:to>
+                                        <p:strVal val="visible"/>
+                                      </p:to>
+                                    </p:set>
+                                  </p:childTnLst>
+                                </p:cTn>
+                              </p:par>
+                            </p:childTnLst>
+                          </p:cTn>
+                        </p:par>
+                      </p:childTnLst>
+                    </p:cTn>
+                  </p:par>
+                  <p:par>
+                    <p:cTn id="19" fill="hold">
+                      <p:stCondLst>
+                        <p:cond delay="indefinite"/>
+                      </p:stCondLst>
+                      <p:childTnLst>
+                        <p:par>
+                          <p:cTn id="20" fill="hold">
+                            <p:stCondLst>
+                              <p:cond delay="0"/>
+                            </p:stCondLst>
+                            <p:childTnLst>
+                              <p:par>
+                                <p:cTn id="21" presetID="1" presetClass="entr" presetSubtype="0" fill="hold" grpId="0" nodeType="clickEffect">
+                                  <p:stCondLst>
+                                    <p:cond delay="0"/>
+                                  </p:stCondLst>
+                                  <p:childTnLst>
+                                    <p:set>
+                                      <p:cBhvr>
+                                        <p:cTn id="22" dur="1" fill="hold">
+                                          <p:stCondLst>
+                                            <p:cond delay="0"/>
+                                          </p:stCondLst>
+                                        </p:cTn>
+                                        <p:tgtEl>
+                                          <p:spTgt spid="3">
+                                            <p:txEl>
+                                              <p:pRg st="4" end="4"/>
+                                            </p:txEl>
+                                          </p:spTgt>
+                                        </p:tgtEl>
+                                        <p:attrNameLst>
+                                          <p:attrName>style.visibility</p:attrName>
+                                        </p:attrNameLst>
+                                      </p:cBhvr>
+                                      <p:to>
+                                        <p:strVal val="visible"/>
+                                      </p:to>
+                                    </p:set>
+                                  </p:childTnLst>
+                                </p:cTn>
+                              </p:par>
+                              <p:par>
+                                <p:cTn id="23" presetID="1" presetClass="entr" presetSubtype="0" fill="hold" grpId="0" nodeType="withEffect">
+                                  <p:stCondLst>
+                                    <p:cond delay="0"/>
+                                  </p:stCondLst>
+                                  <p:childTnLst>
+                                    <p:set>
+                                      <p:cBhvr>
+                                        <p:cTn id="24" dur="1" fill="hold">
+                                          <p:stCondLst>
+                                            <p:cond delay="0"/>
+                                          </p:stCondLst>
+                                        </p:cTn>
+                                        <p:tgtEl>
+                                          <p:spTgt spid="3">
+                                            <p:txEl>
+                                              <p:pRg st="5" end="5"/>
                                             </p:txEl>
                                           </p:spTgt>
                                         </p:tgtEl>
@@ -28927,521 +28665,6 @@
       </p:grpSpPr>
       <p:sp>
         <p:nvSpPr>
-          <p:cNvPr id="2" name="Title 1">
-            <a:extLst>
-              <a:ext uri="{FF2B5EF4-FFF2-40B4-BE49-F238E27FC236}">
-                <a16:creationId xmlns:a16="http://schemas.microsoft.com/office/drawing/2014/main" id="{93AA26DA-9EBE-4A51-845C-B0968922BA9B}"/>
-              </a:ext>
-            </a:extLst>
-          </p:cNvPr>
-          <p:cNvSpPr>
-            <a:spLocks noGrp="1"/>
-          </p:cNvSpPr>
-          <p:nvPr>
-            <p:ph type="title"/>
-          </p:nvPr>
-        </p:nvSpPr>
-        <p:spPr>
-          <a:xfrm>
-            <a:off x="379514" y="182216"/>
-            <a:ext cx="11524432" cy="663604"/>
-          </a:xfrm>
-        </p:spPr>
-        <p:txBody>
-          <a:bodyPr>
-            <a:normAutofit/>
-          </a:bodyPr>
-          <a:lstStyle/>
-          <a:p>
-            <a:r>
-              <a:rPr lang="en-US" dirty="0">
-                <a:latin typeface="Segoe UI" panose="020B0502040204020203" pitchFamily="34" charset="0"/>
-                <a:cs typeface="Segoe UI" panose="020B0502040204020203" pitchFamily="34" charset="0"/>
-              </a:rPr>
-              <a:t>Selecting Initial Weight Values</a:t>
-            </a:r>
-          </a:p>
-        </p:txBody>
-      </p:sp>
-      <p:sp>
-        <p:nvSpPr>
-          <p:cNvPr id="3" name="Content Placeholder 2">
-            <a:extLst>
-              <a:ext uri="{FF2B5EF4-FFF2-40B4-BE49-F238E27FC236}">
-                <a16:creationId xmlns:a16="http://schemas.microsoft.com/office/drawing/2014/main" id="{FB861F63-F6C3-45B7-B4A8-9B2C4F00C8DF}"/>
-              </a:ext>
-            </a:extLst>
-          </p:cNvPr>
-          <p:cNvSpPr>
-            <a:spLocks noGrp="1"/>
-          </p:cNvSpPr>
-          <p:nvPr>
-            <p:ph sz="quarter" idx="10"/>
-          </p:nvPr>
-        </p:nvSpPr>
-        <p:spPr>
-          <a:xfrm>
-            <a:off x="424815" y="902970"/>
-            <a:ext cx="11525250" cy="5303520"/>
-          </a:xfrm>
-        </p:spPr>
-        <p:txBody>
-          <a:bodyPr/>
-          <a:lstStyle/>
-          <a:p>
-            <a:r>
-              <a:rPr lang="en-US" sz="2800" dirty="0">
-                <a:latin typeface="Segoe UI" panose="020B0502040204020203" pitchFamily="34" charset="0"/>
-                <a:cs typeface="Segoe UI" panose="020B0502040204020203" pitchFamily="34" charset="0"/>
-              </a:rPr>
-              <a:t>To prevent weights from becoming linearly dependent the </a:t>
-            </a:r>
-            <a:r>
-              <a:rPr lang="en-US" sz="2800" b="1" dirty="0">
-                <a:latin typeface="Segoe UI" panose="020B0502040204020203" pitchFamily="34" charset="0"/>
-                <a:cs typeface="Segoe UI" panose="020B0502040204020203" pitchFamily="34" charset="0"/>
-              </a:rPr>
-              <a:t>initial values must be randomly selected</a:t>
-            </a:r>
-          </a:p>
-          <a:p>
-            <a:pPr lvl="1">
-              <a:buFont typeface="Wingdings" panose="05000000000000000000" pitchFamily="2" charset="2"/>
-              <a:buChar char="§"/>
-            </a:pPr>
-            <a:r>
-              <a:rPr lang="en-US" sz="2400" dirty="0">
-                <a:latin typeface="Segoe UI" panose="020B0502040204020203" pitchFamily="34" charset="0"/>
-                <a:cs typeface="Segoe UI" panose="020B0502040204020203" pitchFamily="34" charset="0"/>
-              </a:rPr>
-              <a:t>Otherwise, some weight values are never learned</a:t>
-            </a:r>
-          </a:p>
-          <a:p>
-            <a:r>
-              <a:rPr lang="en-US" sz="2800" dirty="0">
-                <a:latin typeface="Segoe UI" panose="020B0502040204020203" pitchFamily="34" charset="0"/>
-                <a:cs typeface="Segoe UI" panose="020B0502040204020203" pitchFamily="34" charset="0"/>
-              </a:rPr>
-              <a:t>Simple truncated Gaussian or Uniform distributed values work well in practice</a:t>
-            </a:r>
-          </a:p>
-          <a:p>
-            <a:pPr lvl="1">
-              <a:buFont typeface="Wingdings" panose="05000000000000000000" pitchFamily="2" charset="2"/>
-              <a:buChar char="§"/>
-            </a:pPr>
-            <a:r>
-              <a:rPr lang="en-US" sz="2400" dirty="0">
-                <a:latin typeface="Segoe UI" panose="020B0502040204020203" pitchFamily="34" charset="0"/>
-                <a:cs typeface="Segoe UI" panose="020B0502040204020203" pitchFamily="34" charset="0"/>
-              </a:rPr>
-              <a:t>This process is referred as adding </a:t>
-            </a:r>
-            <a:r>
-              <a:rPr lang="en-US" sz="2400" b="1" dirty="0">
-                <a:latin typeface="Segoe UI" panose="020B0502040204020203" pitchFamily="34" charset="0"/>
-                <a:cs typeface="Segoe UI" panose="020B0502040204020203" pitchFamily="34" charset="0"/>
-              </a:rPr>
-              <a:t>fuzz</a:t>
-            </a:r>
-            <a:r>
-              <a:rPr lang="en-US" sz="2400" dirty="0">
-                <a:latin typeface="Segoe UI" panose="020B0502040204020203" pitchFamily="34" charset="0"/>
-                <a:cs typeface="Segoe UI" panose="020B0502040204020203" pitchFamily="34" charset="0"/>
-              </a:rPr>
-              <a:t> to the initial values</a:t>
-            </a:r>
-          </a:p>
-          <a:p>
-            <a:pPr>
-              <a:buFont typeface="Wingdings" panose="05000000000000000000" pitchFamily="2" charset="2"/>
-              <a:buChar char="§"/>
-            </a:pPr>
-            <a:r>
-              <a:rPr lang="en-US" sz="2800" dirty="0">
-                <a:latin typeface="Segoe UI" panose="020B0502040204020203" pitchFamily="34" charset="0"/>
-                <a:cs typeface="Segoe UI" panose="020B0502040204020203" pitchFamily="34" charset="0"/>
-              </a:rPr>
-              <a:t>Many other initialization schemes have been developed</a:t>
-            </a:r>
-          </a:p>
-          <a:p>
-            <a:pPr lvl="1">
-              <a:buFont typeface="Wingdings" panose="05000000000000000000" pitchFamily="2" charset="2"/>
-              <a:buChar char="§"/>
-            </a:pPr>
-            <a:r>
-              <a:rPr lang="en-US" sz="2400" dirty="0">
-                <a:latin typeface="Segoe UI" panose="020B0502040204020203" pitchFamily="34" charset="0"/>
-                <a:cs typeface="Segoe UI" panose="020B0502040204020203" pitchFamily="34" charset="0"/>
-              </a:rPr>
-              <a:t>For example, see the </a:t>
-            </a:r>
-            <a:r>
-              <a:rPr lang="en-US" sz="2400" dirty="0" err="1">
-                <a:latin typeface="Segoe UI" panose="020B0502040204020203" pitchFamily="34" charset="0"/>
-                <a:cs typeface="Segoe UI" panose="020B0502040204020203" pitchFamily="34" charset="0"/>
-                <a:hlinkClick r:id="rId2"/>
-              </a:rPr>
-              <a:t>Keras</a:t>
-            </a:r>
-            <a:r>
-              <a:rPr lang="en-US" sz="2400" dirty="0">
-                <a:latin typeface="Segoe UI" panose="020B0502040204020203" pitchFamily="34" charset="0"/>
-                <a:cs typeface="Segoe UI" panose="020B0502040204020203" pitchFamily="34" charset="0"/>
-                <a:hlinkClick r:id="rId2"/>
-              </a:rPr>
-              <a:t> initializers documentation</a:t>
-            </a:r>
-            <a:endParaRPr lang="en-US" sz="2400" dirty="0">
-              <a:latin typeface="Segoe UI" panose="020B0502040204020203" pitchFamily="34" charset="0"/>
-              <a:cs typeface="Segoe UI" panose="020B0502040204020203" pitchFamily="34" charset="0"/>
-            </a:endParaRPr>
-          </a:p>
-        </p:txBody>
-      </p:sp>
-    </p:spTree>
-    <p:extLst>
-      <p:ext uri="{BB962C8B-B14F-4D97-AF65-F5344CB8AC3E}">
-        <p14:creationId xmlns:p14="http://schemas.microsoft.com/office/powerpoint/2010/main" val="1342241391"/>
-      </p:ext>
-    </p:extLst>
-  </p:cSld>
-  <p:clrMapOvr>
-    <a:masterClrMapping/>
-  </p:clrMapOvr>
-  <p:timing>
-    <p:tnLst>
-      <p:par>
-        <p:cTn id="1" dur="indefinite" restart="never" nodeType="tmRoot">
-          <p:childTnLst>
-            <p:seq concurrent="1" nextAc="seek">
-              <p:cTn id="2" dur="indefinite" nodeType="mainSeq">
-                <p:childTnLst>
-                  <p:par>
-                    <p:cTn id="3" fill="hold">
-                      <p:stCondLst>
-                        <p:cond delay="indefinite"/>
-                      </p:stCondLst>
-                      <p:childTnLst>
-                        <p:par>
-                          <p:cTn id="4" fill="hold">
-                            <p:stCondLst>
-                              <p:cond delay="0"/>
-                            </p:stCondLst>
-                            <p:childTnLst>
-                              <p:par>
-                                <p:cTn id="5" presetID="1" presetClass="entr" presetSubtype="0" fill="hold" grpId="0" nodeType="clickEffect">
-                                  <p:stCondLst>
-                                    <p:cond delay="0"/>
-                                  </p:stCondLst>
-                                  <p:childTnLst>
-                                    <p:set>
-                                      <p:cBhvr>
-                                        <p:cTn id="6" dur="1" fill="hold">
-                                          <p:stCondLst>
-                                            <p:cond delay="0"/>
-                                          </p:stCondLst>
-                                        </p:cTn>
-                                        <p:tgtEl>
-                                          <p:spTgt spid="3">
-                                            <p:txEl>
-                                              <p:pRg st="0" end="0"/>
-                                            </p:txEl>
-                                          </p:spTgt>
-                                        </p:tgtEl>
-                                        <p:attrNameLst>
-                                          <p:attrName>style.visibility</p:attrName>
-                                        </p:attrNameLst>
-                                      </p:cBhvr>
-                                      <p:to>
-                                        <p:strVal val="visible"/>
-                                      </p:to>
-                                    </p:set>
-                                  </p:childTnLst>
-                                </p:cTn>
-                              </p:par>
-                            </p:childTnLst>
-                          </p:cTn>
-                        </p:par>
-                      </p:childTnLst>
-                    </p:cTn>
-                  </p:par>
-                  <p:par>
-                    <p:cTn id="7" fill="hold">
-                      <p:stCondLst>
-                        <p:cond delay="indefinite"/>
-                      </p:stCondLst>
-                      <p:childTnLst>
-                        <p:par>
-                          <p:cTn id="8" fill="hold">
-                            <p:stCondLst>
-                              <p:cond delay="0"/>
-                            </p:stCondLst>
-                            <p:childTnLst>
-                              <p:par>
-                                <p:cTn id="9" presetID="1" presetClass="entr" presetSubtype="0" fill="hold" grpId="0" nodeType="clickEffect">
-                                  <p:stCondLst>
-                                    <p:cond delay="0"/>
-                                  </p:stCondLst>
-                                  <p:childTnLst>
-                                    <p:set>
-                                      <p:cBhvr>
-                                        <p:cTn id="10" dur="1" fill="hold">
-                                          <p:stCondLst>
-                                            <p:cond delay="0"/>
-                                          </p:stCondLst>
-                                        </p:cTn>
-                                        <p:tgtEl>
-                                          <p:spTgt spid="3">
-                                            <p:txEl>
-                                              <p:pRg st="1" end="1"/>
-                                            </p:txEl>
-                                          </p:spTgt>
-                                        </p:tgtEl>
-                                        <p:attrNameLst>
-                                          <p:attrName>style.visibility</p:attrName>
-                                        </p:attrNameLst>
-                                      </p:cBhvr>
-                                      <p:to>
-                                        <p:strVal val="visible"/>
-                                      </p:to>
-                                    </p:set>
-                                  </p:childTnLst>
-                                </p:cTn>
-                              </p:par>
-                            </p:childTnLst>
-                          </p:cTn>
-                        </p:par>
-                      </p:childTnLst>
-                    </p:cTn>
-                  </p:par>
-                  <p:par>
-                    <p:cTn id="11" fill="hold">
-                      <p:stCondLst>
-                        <p:cond delay="indefinite"/>
-                      </p:stCondLst>
-                      <p:childTnLst>
-                        <p:par>
-                          <p:cTn id="12" fill="hold">
-                            <p:stCondLst>
-                              <p:cond delay="0"/>
-                            </p:stCondLst>
-                            <p:childTnLst>
-                              <p:par>
-                                <p:cTn id="13" presetID="1" presetClass="entr" presetSubtype="0" fill="hold" grpId="0" nodeType="clickEffect">
-                                  <p:stCondLst>
-                                    <p:cond delay="0"/>
-                                  </p:stCondLst>
-                                  <p:childTnLst>
-                                    <p:set>
-                                      <p:cBhvr>
-                                        <p:cTn id="14" dur="1" fill="hold">
-                                          <p:stCondLst>
-                                            <p:cond delay="0"/>
-                                          </p:stCondLst>
-                                        </p:cTn>
-                                        <p:tgtEl>
-                                          <p:spTgt spid="3">
-                                            <p:txEl>
-                                              <p:pRg st="2" end="2"/>
-                                            </p:txEl>
-                                          </p:spTgt>
-                                        </p:tgtEl>
-                                        <p:attrNameLst>
-                                          <p:attrName>style.visibility</p:attrName>
-                                        </p:attrNameLst>
-                                      </p:cBhvr>
-                                      <p:to>
-                                        <p:strVal val="visible"/>
-                                      </p:to>
-                                    </p:set>
-                                  </p:childTnLst>
-                                </p:cTn>
-                              </p:par>
-                            </p:childTnLst>
-                          </p:cTn>
-                        </p:par>
-                      </p:childTnLst>
-                    </p:cTn>
-                  </p:par>
-                  <p:par>
-                    <p:cTn id="15" fill="hold">
-                      <p:stCondLst>
-                        <p:cond delay="indefinite"/>
-                      </p:stCondLst>
-                      <p:childTnLst>
-                        <p:par>
-                          <p:cTn id="16" fill="hold">
-                            <p:stCondLst>
-                              <p:cond delay="0"/>
-                            </p:stCondLst>
-                            <p:childTnLst>
-                              <p:par>
-                                <p:cTn id="17" presetID="1" presetClass="entr" presetSubtype="0" fill="hold" grpId="0" nodeType="clickEffect">
-                                  <p:stCondLst>
-                                    <p:cond delay="0"/>
-                                  </p:stCondLst>
-                                  <p:childTnLst>
-                                    <p:set>
-                                      <p:cBhvr>
-                                        <p:cTn id="18" dur="1" fill="hold">
-                                          <p:stCondLst>
-                                            <p:cond delay="0"/>
-                                          </p:stCondLst>
-                                        </p:cTn>
-                                        <p:tgtEl>
-                                          <p:spTgt spid="3">
-                                            <p:txEl>
-                                              <p:pRg st="3" end="3"/>
-                                            </p:txEl>
-                                          </p:spTgt>
-                                        </p:tgtEl>
-                                        <p:attrNameLst>
-                                          <p:attrName>style.visibility</p:attrName>
-                                        </p:attrNameLst>
-                                      </p:cBhvr>
-                                      <p:to>
-                                        <p:strVal val="visible"/>
-                                      </p:to>
-                                    </p:set>
-                                  </p:childTnLst>
-                                </p:cTn>
-                              </p:par>
-                            </p:childTnLst>
-                          </p:cTn>
-                        </p:par>
-                      </p:childTnLst>
-                    </p:cTn>
-                  </p:par>
-                  <p:par>
-                    <p:cTn id="19" fill="hold">
-                      <p:stCondLst>
-                        <p:cond delay="indefinite"/>
-                      </p:stCondLst>
-                      <p:childTnLst>
-                        <p:par>
-                          <p:cTn id="20" fill="hold">
-                            <p:stCondLst>
-                              <p:cond delay="0"/>
-                            </p:stCondLst>
-                            <p:childTnLst>
-                              <p:par>
-                                <p:cTn id="21" presetID="1" presetClass="entr" presetSubtype="0" fill="hold" grpId="0" nodeType="clickEffect">
-                                  <p:stCondLst>
-                                    <p:cond delay="0"/>
-                                  </p:stCondLst>
-                                  <p:childTnLst>
-                                    <p:set>
-                                      <p:cBhvr>
-                                        <p:cTn id="22" dur="1" fill="hold">
-                                          <p:stCondLst>
-                                            <p:cond delay="0"/>
-                                          </p:stCondLst>
-                                        </p:cTn>
-                                        <p:tgtEl>
-                                          <p:spTgt spid="3">
-                                            <p:txEl>
-                                              <p:pRg st="4" end="4"/>
-                                            </p:txEl>
-                                          </p:spTgt>
-                                        </p:tgtEl>
-                                        <p:attrNameLst>
-                                          <p:attrName>style.visibility</p:attrName>
-                                        </p:attrNameLst>
-                                      </p:cBhvr>
-                                      <p:to>
-                                        <p:strVal val="visible"/>
-                                      </p:to>
-                                    </p:set>
-                                  </p:childTnLst>
-                                </p:cTn>
-                              </p:par>
-                              <p:par>
-                                <p:cTn id="23" presetID="1" presetClass="entr" presetSubtype="0" fill="hold" grpId="0" nodeType="withEffect">
-                                  <p:stCondLst>
-                                    <p:cond delay="0"/>
-                                  </p:stCondLst>
-                                  <p:childTnLst>
-                                    <p:set>
-                                      <p:cBhvr>
-                                        <p:cTn id="24" dur="1" fill="hold">
-                                          <p:stCondLst>
-                                            <p:cond delay="0"/>
-                                          </p:stCondLst>
-                                        </p:cTn>
-                                        <p:tgtEl>
-                                          <p:spTgt spid="3">
-                                            <p:txEl>
-                                              <p:pRg st="5" end="5"/>
-                                            </p:txEl>
-                                          </p:spTgt>
-                                        </p:tgtEl>
-                                        <p:attrNameLst>
-                                          <p:attrName>style.visibility</p:attrName>
-                                        </p:attrNameLst>
-                                      </p:cBhvr>
-                                      <p:to>
-                                        <p:strVal val="visible"/>
-                                      </p:to>
-                                    </p:set>
-                                  </p:childTnLst>
-                                </p:cTn>
-                              </p:par>
-                            </p:childTnLst>
-                          </p:cTn>
-                        </p:par>
-                      </p:childTnLst>
-                    </p:cTn>
-                  </p:par>
-                </p:childTnLst>
-              </p:cTn>
-              <p:prevCondLst>
-                <p:cond evt="onPrev" delay="0">
-                  <p:tgtEl>
-                    <p:sldTgt/>
-                  </p:tgtEl>
-                </p:cond>
-              </p:prevCondLst>
-              <p:nextCondLst>
-                <p:cond evt="onNext" delay="0">
-                  <p:tgtEl>
-                    <p:sldTgt/>
-                  </p:tgtEl>
-                </p:cond>
-              </p:nextCondLst>
-            </p:seq>
-          </p:childTnLst>
-        </p:cTn>
-      </p:par>
-    </p:tnLst>
-    <p:bldLst>
-      <p:bldP spid="3" grpId="0" uiExpand="1" build="p"/>
-    </p:bldLst>
-  </p:timing>
-</p:sld>
-</file>
-
-<file path=ppt/slides/slide41.xml><?xml version="1.0" encoding="utf-8"?>
-<p:sld xmlns:a="http://schemas.openxmlformats.org/drawingml/2006/main" xmlns:r="http://schemas.openxmlformats.org/officeDocument/2006/relationships" xmlns:p="http://schemas.openxmlformats.org/presentationml/2006/main">
-  <p:cSld>
-    <p:spTree>
-      <p:nvGrpSpPr>
-        <p:cNvPr id="1" name=""/>
-        <p:cNvGrpSpPr/>
-        <p:nvPr/>
-      </p:nvGrpSpPr>
-      <p:grpSpPr>
-        <a:xfrm>
-          <a:off x="0" y="0"/>
-          <a:ext cx="0" cy="0"/>
-          <a:chOff x="0" y="0"/>
-          <a:chExt cx="0" cy="0"/>
-        </a:xfrm>
-      </p:grpSpPr>
-      <p:sp>
-        <p:nvSpPr>
           <p:cNvPr id="2" name="Subtitle 1">
             <a:extLst>
               <a:ext uri="{FF2B5EF4-FFF2-40B4-BE49-F238E27FC236}">
@@ -29488,7 +28711,7 @@
 </p:sld>
 </file>
 
-<file path=ppt/slides/slide42.xml><?xml version="1.0" encoding="utf-8"?>
+<file path=ppt/slides/slide41.xml><?xml version="1.0" encoding="utf-8"?>
 <p:sld xmlns:a="http://schemas.openxmlformats.org/drawingml/2006/main" xmlns:r="http://schemas.openxmlformats.org/officeDocument/2006/relationships" xmlns:p="http://schemas.openxmlformats.org/presentationml/2006/main">
   <p:cSld>
     <p:spTree>
@@ -30091,7 +29314,7 @@
 </p:sld>
 </file>
 
-<file path=ppt/slides/slide43.xml><?xml version="1.0" encoding="utf-8"?>
+<file path=ppt/slides/slide42.xml><?xml version="1.0" encoding="utf-8"?>
 <p:sld xmlns:a="http://schemas.openxmlformats.org/drawingml/2006/main" xmlns:r="http://schemas.openxmlformats.org/officeDocument/2006/relationships" xmlns:p="http://schemas.openxmlformats.org/presentationml/2006/main">
   <p:cSld>
     <p:spTree>
@@ -30699,7 +29922,7 @@
 </p:sld>
 </file>
 
-<file path=ppt/slides/slide44.xml><?xml version="1.0" encoding="utf-8"?>
+<file path=ppt/slides/slide43.xml><?xml version="1.0" encoding="utf-8"?>
 <p:sld xmlns:a="http://schemas.openxmlformats.org/drawingml/2006/main" xmlns:r="http://schemas.openxmlformats.org/officeDocument/2006/relationships" xmlns:p="http://schemas.openxmlformats.org/presentationml/2006/main">
   <p:cSld>
     <p:spTree>
@@ -31269,7 +30492,7 @@
 </p:sld>
 </file>
 
-<file path=ppt/slides/slide45.xml><?xml version="1.0" encoding="utf-8"?>
+<file path=ppt/slides/slide44.xml><?xml version="1.0" encoding="utf-8"?>
 <p:sld xmlns:a="http://schemas.openxmlformats.org/drawingml/2006/main" xmlns:r="http://schemas.openxmlformats.org/officeDocument/2006/relationships" xmlns:p="http://schemas.openxmlformats.org/presentationml/2006/main">
   <p:cSld>
     <p:spTree>
@@ -31833,7 +31056,7 @@
 </p:sld>
 </file>
 
-<file path=ppt/slides/slide46.xml><?xml version="1.0" encoding="utf-8"?>
+<file path=ppt/slides/slide45.xml><?xml version="1.0" encoding="utf-8"?>
 <p:sld xmlns:a="http://schemas.openxmlformats.org/drawingml/2006/main" xmlns:r="http://schemas.openxmlformats.org/officeDocument/2006/relationships" xmlns:p="http://schemas.openxmlformats.org/presentationml/2006/main">
   <p:cSld>
     <p:spTree>
@@ -32383,7 +31606,7 @@
 </p:sld>
 </file>
 
-<file path=ppt/slides/slide47.xml><?xml version="1.0" encoding="utf-8"?>
+<file path=ppt/slides/slide46.xml><?xml version="1.0" encoding="utf-8"?>
 <p:sld xmlns:a="http://schemas.openxmlformats.org/drawingml/2006/main" xmlns:r="http://schemas.openxmlformats.org/officeDocument/2006/relationships" xmlns:p="http://schemas.openxmlformats.org/presentationml/2006/main">
   <p:cSld>
     <p:spTree>
@@ -33023,7 +32246,7 @@
 </p:sld>
 </file>
 
-<file path=ppt/slides/slide48.xml><?xml version="1.0" encoding="utf-8"?>
+<file path=ppt/slides/slide47.xml><?xml version="1.0" encoding="utf-8"?>
 <p:sld xmlns:a="http://schemas.openxmlformats.org/drawingml/2006/main" xmlns:r="http://schemas.openxmlformats.org/officeDocument/2006/relationships" xmlns:p="http://schemas.openxmlformats.org/presentationml/2006/main">
   <p:cSld>
     <p:spTree>
@@ -33726,7 +32949,7 @@
 </p:sld>
 </file>
 
-<file path=ppt/slides/slide49.xml><?xml version="1.0" encoding="utf-8"?>
+<file path=ppt/slides/slide48.xml><?xml version="1.0" encoding="utf-8"?>
 <p:sld xmlns:a="http://schemas.openxmlformats.org/drawingml/2006/main" xmlns:r="http://schemas.openxmlformats.org/officeDocument/2006/relationships" xmlns:p="http://schemas.openxmlformats.org/presentationml/2006/main">
   <p:cSld>
     <p:spTree>
@@ -34283,6 +33506,614 @@
                                         </p:cTn>
                                         <p:tgtEl>
                                           <p:spTgt spid="7"/>
+                                        </p:tgtEl>
+                                        <p:attrNameLst>
+                                          <p:attrName>style.visibility</p:attrName>
+                                        </p:attrNameLst>
+                                      </p:cBhvr>
+                                      <p:to>
+                                        <p:strVal val="visible"/>
+                                      </p:to>
+                                    </p:set>
+                                  </p:childTnLst>
+                                </p:cTn>
+                              </p:par>
+                            </p:childTnLst>
+                          </p:cTn>
+                        </p:par>
+                      </p:childTnLst>
+                    </p:cTn>
+                  </p:par>
+                </p:childTnLst>
+              </p:cTn>
+              <p:prevCondLst>
+                <p:cond evt="onPrev" delay="0">
+                  <p:tgtEl>
+                    <p:sldTgt/>
+                  </p:tgtEl>
+                </p:cond>
+              </p:prevCondLst>
+              <p:nextCondLst>
+                <p:cond evt="onNext" delay="0">
+                  <p:tgtEl>
+                    <p:sldTgt/>
+                  </p:tgtEl>
+                </p:cond>
+              </p:nextCondLst>
+            </p:seq>
+          </p:childTnLst>
+        </p:cTn>
+      </p:par>
+    </p:tnLst>
+    <p:bldLst>
+      <p:bldP spid="3" grpId="0" uiExpand="1" build="p"/>
+    </p:bldLst>
+  </p:timing>
+</p:sld>
+</file>
+
+<file path=ppt/slides/slide49.xml><?xml version="1.0" encoding="utf-8"?>
+<p:sld xmlns:a="http://schemas.openxmlformats.org/drawingml/2006/main" xmlns:r="http://schemas.openxmlformats.org/officeDocument/2006/relationships" xmlns:p="http://schemas.openxmlformats.org/presentationml/2006/main">
+  <p:cSld>
+    <p:spTree>
+      <p:nvGrpSpPr>
+        <p:cNvPr id="1" name=""/>
+        <p:cNvGrpSpPr/>
+        <p:nvPr/>
+      </p:nvGrpSpPr>
+      <p:grpSpPr>
+        <a:xfrm>
+          <a:off x="0" y="0"/>
+          <a:ext cx="0" cy="0"/>
+          <a:chOff x="0" y="0"/>
+          <a:chExt cx="0" cy="0"/>
+        </a:xfrm>
+      </p:grpSpPr>
+      <p:sp>
+        <p:nvSpPr>
+          <p:cNvPr id="2" name="Title 1">
+            <a:extLst>
+              <a:ext uri="{FF2B5EF4-FFF2-40B4-BE49-F238E27FC236}">
+                <a16:creationId xmlns:a16="http://schemas.microsoft.com/office/drawing/2014/main" id="{2E28F462-DC1F-48AF-8BA3-5D8B887182ED}"/>
+              </a:ext>
+            </a:extLst>
+          </p:cNvPr>
+          <p:cNvSpPr>
+            <a:spLocks noGrp="1"/>
+          </p:cNvSpPr>
+          <p:nvPr>
+            <p:ph type="title"/>
+          </p:nvPr>
+        </p:nvSpPr>
+        <p:spPr/>
+        <p:txBody>
+          <a:bodyPr/>
+          <a:lstStyle/>
+          <a:p>
+            <a:r>
+              <a:rPr lang="en-US" dirty="0">
+                <a:latin typeface="Segoe UI" panose="020B0502040204020203" pitchFamily="34" charset="0"/>
+                <a:cs typeface="Segoe UI" panose="020B0502040204020203" pitchFamily="34" charset="0"/>
+              </a:rPr>
+              <a:t>Review of Eigenvalues</a:t>
+            </a:r>
+          </a:p>
+        </p:txBody>
+      </p:sp>
+      <p:sp>
+        <p:nvSpPr>
+          <p:cNvPr id="3" name="Content Placeholder 2">
+            <a:extLst>
+              <a:ext uri="{FF2B5EF4-FFF2-40B4-BE49-F238E27FC236}">
+                <a16:creationId xmlns:a16="http://schemas.microsoft.com/office/drawing/2014/main" id="{6948E274-B4C9-49D5-BB15-6A382137E2DD}"/>
+              </a:ext>
+            </a:extLst>
+          </p:cNvPr>
+          <p:cNvSpPr>
+            <a:spLocks noGrp="1"/>
+          </p:cNvSpPr>
+          <p:nvPr>
+            <p:ph sz="quarter" idx="10"/>
+          </p:nvPr>
+        </p:nvSpPr>
+        <p:spPr>
+          <a:xfrm>
+            <a:off x="379514" y="872411"/>
+            <a:ext cx="11525250" cy="5803374"/>
+          </a:xfrm>
+        </p:spPr>
+        <p:txBody>
+          <a:bodyPr/>
+          <a:lstStyle/>
+          <a:p>
+            <a:pPr marL="0" indent="0">
+              <a:buNone/>
+            </a:pPr>
+            <a:r>
+              <a:rPr lang="en-US" b="1" dirty="0">
+                <a:latin typeface="Segoe UI" panose="020B0502040204020203" pitchFamily="34" charset="0"/>
+                <a:cs typeface="Segoe UI" panose="020B0502040204020203" pitchFamily="34" charset="0"/>
+              </a:rPr>
+              <a:t>Eigenvalues</a:t>
+            </a:r>
+            <a:r>
+              <a:rPr lang="en-US" dirty="0">
+                <a:latin typeface="Segoe UI" panose="020B0502040204020203" pitchFamily="34" charset="0"/>
+                <a:cs typeface="Segoe UI" panose="020B0502040204020203" pitchFamily="34" charset="0"/>
+              </a:rPr>
+              <a:t> are characteristic roots or characteristic values of a linear system</a:t>
+            </a:r>
+          </a:p>
+          <a:p>
+            <a:r>
+              <a:rPr lang="en-US" sz="2800" dirty="0">
+                <a:latin typeface="Segoe UI" panose="020B0502040204020203" pitchFamily="34" charset="0"/>
+                <a:cs typeface="Segoe UI" panose="020B0502040204020203" pitchFamily="34" charset="0"/>
+              </a:rPr>
+              <a:t>Rewrite the eigenvalue relationship: </a:t>
+            </a:r>
+          </a:p>
+          <a:p>
+            <a:endParaRPr lang="en-US" sz="2800" dirty="0">
+              <a:latin typeface="Segoe UI" panose="020B0502040204020203" pitchFamily="34" charset="0"/>
+              <a:cs typeface="Segoe UI" panose="020B0502040204020203" pitchFamily="34" charset="0"/>
+            </a:endParaRPr>
+          </a:p>
+          <a:p>
+            <a:endParaRPr lang="en-US" sz="2800" dirty="0">
+              <a:latin typeface="Segoe UI" panose="020B0502040204020203" pitchFamily="34" charset="0"/>
+              <a:cs typeface="Segoe UI" panose="020B0502040204020203" pitchFamily="34" charset="0"/>
+            </a:endParaRPr>
+          </a:p>
+          <a:p>
+            <a:endParaRPr lang="en-US" sz="2800" dirty="0">
+              <a:latin typeface="Segoe UI" panose="020B0502040204020203" pitchFamily="34" charset="0"/>
+              <a:cs typeface="Segoe UI" panose="020B0502040204020203" pitchFamily="34" charset="0"/>
+            </a:endParaRPr>
+          </a:p>
+          <a:p>
+            <a:endParaRPr lang="en-US" sz="2800" dirty="0">
+              <a:latin typeface="Segoe UI" panose="020B0502040204020203" pitchFamily="34" charset="0"/>
+              <a:cs typeface="Segoe UI" panose="020B0502040204020203" pitchFamily="34" charset="0"/>
+            </a:endParaRPr>
+          </a:p>
+          <a:p>
+            <a:r>
+              <a:rPr lang="en-US" sz="2800" dirty="0">
+                <a:latin typeface="Segoe UI" panose="020B0502040204020203" pitchFamily="34" charset="0"/>
+                <a:cs typeface="Segoe UI" panose="020B0502040204020203" pitchFamily="34" charset="0"/>
+              </a:rPr>
+              <a:t>To see that </a:t>
+            </a:r>
+            <a:r>
+              <a:rPr lang="en-US" sz="2800" dirty="0">
+                <a:latin typeface="Symbol" panose="05050102010706020507" pitchFamily="18" charset="2"/>
+                <a:cs typeface="Segoe UI" panose="020B0502040204020203" pitchFamily="34" charset="0"/>
+              </a:rPr>
+              <a:t>l</a:t>
+            </a:r>
+            <a:r>
+              <a:rPr lang="en-US" sz="2800" dirty="0">
+                <a:latin typeface="Segoe UI" panose="020B0502040204020203" pitchFamily="34" charset="0"/>
+                <a:cs typeface="Segoe UI" panose="020B0502040204020203" pitchFamily="34" charset="0"/>
+              </a:rPr>
+              <a:t> is a root of </a:t>
+            </a:r>
+            <a:r>
+              <a:rPr lang="en-US" sz="2800" i="1" dirty="0">
+                <a:latin typeface="Segoe UI" panose="020B0502040204020203" pitchFamily="34" charset="0"/>
+                <a:cs typeface="Segoe UI" panose="020B0502040204020203" pitchFamily="34" charset="0"/>
+              </a:rPr>
+              <a:t>A</a:t>
+            </a:r>
+            <a:r>
+              <a:rPr lang="en-US" sz="2800" dirty="0">
+                <a:latin typeface="Segoe UI" panose="020B0502040204020203" pitchFamily="34" charset="0"/>
+                <a:cs typeface="Segoe UI" panose="020B0502040204020203" pitchFamily="34" charset="0"/>
+              </a:rPr>
+              <a:t> we can rearrange as follows: </a:t>
+            </a:r>
+          </a:p>
+        </p:txBody>
+      </p:sp>
+      <p:pic>
+        <p:nvPicPr>
+          <p:cNvPr id="7" name="Picture 6">
+            <a:extLst>
+              <a:ext uri="{FF2B5EF4-FFF2-40B4-BE49-F238E27FC236}">
+                <a16:creationId xmlns:a16="http://schemas.microsoft.com/office/drawing/2014/main" id="{9AEA1668-3240-481F-9ADA-8EBE27A38FC1}"/>
+              </a:ext>
+            </a:extLst>
+          </p:cNvPr>
+          <p:cNvPicPr>
+            <a:picLocks noChangeAspect="1"/>
+          </p:cNvPicPr>
+          <p:nvPr/>
+        </p:nvPicPr>
+        <p:blipFill>
+          <a:blip r:embed="rId2"/>
+          <a:stretch>
+            <a:fillRect/>
+          </a:stretch>
+        </p:blipFill>
+        <p:spPr>
+          <a:xfrm>
+            <a:off x="1114391" y="2602221"/>
+            <a:ext cx="1554513" cy="388629"/>
+          </a:xfrm>
+          <a:prstGeom prst="rect">
+            <a:avLst/>
+          </a:prstGeom>
+        </p:spPr>
+      </p:pic>
+      <p:pic>
+        <p:nvPicPr>
+          <p:cNvPr id="4" name="Picture 3">
+            <a:extLst>
+              <a:ext uri="{FF2B5EF4-FFF2-40B4-BE49-F238E27FC236}">
+                <a16:creationId xmlns:a16="http://schemas.microsoft.com/office/drawing/2014/main" id="{DB7ECF0E-4535-45CF-9C92-AF8E6CAD2A2C}"/>
+              </a:ext>
+            </a:extLst>
+          </p:cNvPr>
+          <p:cNvPicPr>
+            <a:picLocks noChangeAspect="1"/>
+          </p:cNvPicPr>
+          <p:nvPr/>
+        </p:nvPicPr>
+        <p:blipFill>
+          <a:blip r:embed="rId3"/>
+          <a:stretch>
+            <a:fillRect/>
+          </a:stretch>
+        </p:blipFill>
+        <p:spPr>
+          <a:xfrm>
+            <a:off x="1114391" y="3185218"/>
+            <a:ext cx="5064260" cy="1775402"/>
+          </a:xfrm>
+          <a:prstGeom prst="rect">
+            <a:avLst/>
+          </a:prstGeom>
+        </p:spPr>
+      </p:pic>
+      <p:pic>
+        <p:nvPicPr>
+          <p:cNvPr id="8" name="Picture 7">
+            <a:extLst>
+              <a:ext uri="{FF2B5EF4-FFF2-40B4-BE49-F238E27FC236}">
+                <a16:creationId xmlns:a16="http://schemas.microsoft.com/office/drawing/2014/main" id="{780533CD-4735-4F33-89BD-8EFA70FAB233}"/>
+              </a:ext>
+            </a:extLst>
+          </p:cNvPr>
+          <p:cNvPicPr>
+            <a:picLocks noChangeAspect="1"/>
+          </p:cNvPicPr>
+          <p:nvPr/>
+        </p:nvPicPr>
+        <p:blipFill>
+          <a:blip r:embed="rId4"/>
+          <a:stretch>
+            <a:fillRect/>
+          </a:stretch>
+        </p:blipFill>
+        <p:spPr>
+          <a:xfrm>
+            <a:off x="3593763" y="5611626"/>
+            <a:ext cx="2446991" cy="341043"/>
+          </a:xfrm>
+          <a:prstGeom prst="rect">
+            <a:avLst/>
+          </a:prstGeom>
+        </p:spPr>
+      </p:pic>
+      <p:pic>
+        <p:nvPicPr>
+          <p:cNvPr id="9" name="Picture 8">
+            <a:extLst>
+              <a:ext uri="{FF2B5EF4-FFF2-40B4-BE49-F238E27FC236}">
+                <a16:creationId xmlns:a16="http://schemas.microsoft.com/office/drawing/2014/main" id="{A5F4DAA7-9F50-47C2-9B46-BABFA5B1ABF3}"/>
+              </a:ext>
+            </a:extLst>
+          </p:cNvPr>
+          <p:cNvPicPr>
+            <a:picLocks noChangeAspect="1"/>
+          </p:cNvPicPr>
+          <p:nvPr/>
+        </p:nvPicPr>
+        <p:blipFill>
+          <a:blip r:embed="rId5"/>
+          <a:stretch>
+            <a:fillRect/>
+          </a:stretch>
+        </p:blipFill>
+        <p:spPr>
+          <a:xfrm>
+            <a:off x="3395696" y="6056341"/>
+            <a:ext cx="2597382" cy="413039"/>
+          </a:xfrm>
+          <a:prstGeom prst="rect">
+            <a:avLst/>
+          </a:prstGeom>
+        </p:spPr>
+      </p:pic>
+    </p:spTree>
+    <p:extLst>
+      <p:ext uri="{BB962C8B-B14F-4D97-AF65-F5344CB8AC3E}">
+        <p14:creationId xmlns:p14="http://schemas.microsoft.com/office/powerpoint/2010/main" val="3740570824"/>
+      </p:ext>
+    </p:extLst>
+  </p:cSld>
+  <p:clrMapOvr>
+    <a:masterClrMapping/>
+  </p:clrMapOvr>
+  <p:timing>
+    <p:tnLst>
+      <p:par>
+        <p:cTn id="1" dur="indefinite" restart="never" nodeType="tmRoot">
+          <p:childTnLst>
+            <p:seq concurrent="1" nextAc="seek">
+              <p:cTn id="2" dur="indefinite" nodeType="mainSeq">
+                <p:childTnLst>
+                  <p:par>
+                    <p:cTn id="3" fill="hold">
+                      <p:stCondLst>
+                        <p:cond delay="indefinite"/>
+                      </p:stCondLst>
+                      <p:childTnLst>
+                        <p:par>
+                          <p:cTn id="4" fill="hold">
+                            <p:stCondLst>
+                              <p:cond delay="0"/>
+                            </p:stCondLst>
+                            <p:childTnLst>
+                              <p:par>
+                                <p:cTn id="5" presetID="1" presetClass="entr" presetSubtype="0" fill="hold" grpId="0" nodeType="clickEffect">
+                                  <p:stCondLst>
+                                    <p:cond delay="0"/>
+                                  </p:stCondLst>
+                                  <p:childTnLst>
+                                    <p:set>
+                                      <p:cBhvr>
+                                        <p:cTn id="6" dur="1" fill="hold">
+                                          <p:stCondLst>
+                                            <p:cond delay="0"/>
+                                          </p:stCondLst>
+                                        </p:cTn>
+                                        <p:tgtEl>
+                                          <p:spTgt spid="3">
+                                            <p:txEl>
+                                              <p:pRg st="1" end="1"/>
+                                            </p:txEl>
+                                          </p:spTgt>
+                                        </p:tgtEl>
+                                        <p:attrNameLst>
+                                          <p:attrName>style.visibility</p:attrName>
+                                        </p:attrNameLst>
+                                      </p:cBhvr>
+                                      <p:to>
+                                        <p:strVal val="visible"/>
+                                      </p:to>
+                                    </p:set>
+                                  </p:childTnLst>
+                                </p:cTn>
+                              </p:par>
+                            </p:childTnLst>
+                          </p:cTn>
+                        </p:par>
+                      </p:childTnLst>
+                    </p:cTn>
+                  </p:par>
+                  <p:par>
+                    <p:cTn id="7" fill="hold">
+                      <p:stCondLst>
+                        <p:cond delay="indefinite"/>
+                      </p:stCondLst>
+                      <p:childTnLst>
+                        <p:par>
+                          <p:cTn id="8" fill="hold">
+                            <p:stCondLst>
+                              <p:cond delay="0"/>
+                            </p:stCondLst>
+                            <p:childTnLst>
+                              <p:par>
+                                <p:cTn id="9" presetID="1" presetClass="entr" presetSubtype="0" fill="hold" nodeType="clickEffect">
+                                  <p:stCondLst>
+                                    <p:cond delay="0"/>
+                                  </p:stCondLst>
+                                  <p:childTnLst>
+                                    <p:set>
+                                      <p:cBhvr>
+                                        <p:cTn id="10" dur="1" fill="hold">
+                                          <p:stCondLst>
+                                            <p:cond delay="0"/>
+                                          </p:stCondLst>
+                                        </p:cTn>
+                                        <p:tgtEl>
+                                          <p:spTgt spid="7"/>
+                                        </p:tgtEl>
+                                        <p:attrNameLst>
+                                          <p:attrName>style.visibility</p:attrName>
+                                        </p:attrNameLst>
+                                      </p:cBhvr>
+                                      <p:to>
+                                        <p:strVal val="visible"/>
+                                      </p:to>
+                                    </p:set>
+                                  </p:childTnLst>
+                                </p:cTn>
+                              </p:par>
+                            </p:childTnLst>
+                          </p:cTn>
+                        </p:par>
+                      </p:childTnLst>
+                    </p:cTn>
+                  </p:par>
+                  <p:par>
+                    <p:cTn id="11" fill="hold">
+                      <p:stCondLst>
+                        <p:cond delay="indefinite"/>
+                      </p:stCondLst>
+                      <p:childTnLst>
+                        <p:par>
+                          <p:cTn id="12" fill="hold">
+                            <p:stCondLst>
+                              <p:cond delay="0"/>
+                            </p:stCondLst>
+                            <p:childTnLst>
+                              <p:par>
+                                <p:cTn id="13" presetID="1" presetClass="entr" presetSubtype="0" fill="hold" nodeType="clickEffect">
+                                  <p:stCondLst>
+                                    <p:cond delay="0"/>
+                                  </p:stCondLst>
+                                  <p:childTnLst>
+                                    <p:set>
+                                      <p:cBhvr>
+                                        <p:cTn id="14" dur="1" fill="hold">
+                                          <p:stCondLst>
+                                            <p:cond delay="0"/>
+                                          </p:stCondLst>
+                                        </p:cTn>
+                                        <p:tgtEl>
+                                          <p:spTgt spid="4"/>
+                                        </p:tgtEl>
+                                        <p:attrNameLst>
+                                          <p:attrName>style.visibility</p:attrName>
+                                        </p:attrNameLst>
+                                      </p:cBhvr>
+                                      <p:to>
+                                        <p:strVal val="visible"/>
+                                      </p:to>
+                                    </p:set>
+                                  </p:childTnLst>
+                                </p:cTn>
+                              </p:par>
+                            </p:childTnLst>
+                          </p:cTn>
+                        </p:par>
+                      </p:childTnLst>
+                    </p:cTn>
+                  </p:par>
+                  <p:par>
+                    <p:cTn id="15" fill="hold">
+                      <p:stCondLst>
+                        <p:cond delay="indefinite"/>
+                      </p:stCondLst>
+                      <p:childTnLst>
+                        <p:par>
+                          <p:cTn id="16" fill="hold">
+                            <p:stCondLst>
+                              <p:cond delay="0"/>
+                            </p:stCondLst>
+                            <p:childTnLst>
+                              <p:par>
+                                <p:cTn id="17" presetID="1" presetClass="entr" presetSubtype="0" fill="hold" grpId="0" nodeType="clickEffect">
+                                  <p:stCondLst>
+                                    <p:cond delay="0"/>
+                                  </p:stCondLst>
+                                  <p:childTnLst>
+                                    <p:set>
+                                      <p:cBhvr>
+                                        <p:cTn id="18" dur="1" fill="hold">
+                                          <p:stCondLst>
+                                            <p:cond delay="0"/>
+                                          </p:stCondLst>
+                                        </p:cTn>
+                                        <p:tgtEl>
+                                          <p:spTgt spid="3">
+                                            <p:txEl>
+                                              <p:pRg st="6" end="6"/>
+                                            </p:txEl>
+                                          </p:spTgt>
+                                        </p:tgtEl>
+                                        <p:attrNameLst>
+                                          <p:attrName>style.visibility</p:attrName>
+                                        </p:attrNameLst>
+                                      </p:cBhvr>
+                                      <p:to>
+                                        <p:strVal val="visible"/>
+                                      </p:to>
+                                    </p:set>
+                                  </p:childTnLst>
+                                </p:cTn>
+                              </p:par>
+                            </p:childTnLst>
+                          </p:cTn>
+                        </p:par>
+                      </p:childTnLst>
+                    </p:cTn>
+                  </p:par>
+                  <p:par>
+                    <p:cTn id="19" fill="hold">
+                      <p:stCondLst>
+                        <p:cond delay="indefinite"/>
+                      </p:stCondLst>
+                      <p:childTnLst>
+                        <p:par>
+                          <p:cTn id="20" fill="hold">
+                            <p:stCondLst>
+                              <p:cond delay="0"/>
+                            </p:stCondLst>
+                            <p:childTnLst>
+                              <p:par>
+                                <p:cTn id="21" presetID="1" presetClass="entr" presetSubtype="0" fill="hold" nodeType="clickEffect">
+                                  <p:stCondLst>
+                                    <p:cond delay="0"/>
+                                  </p:stCondLst>
+                                  <p:childTnLst>
+                                    <p:set>
+                                      <p:cBhvr>
+                                        <p:cTn id="22" dur="1" fill="hold">
+                                          <p:stCondLst>
+                                            <p:cond delay="0"/>
+                                          </p:stCondLst>
+                                        </p:cTn>
+                                        <p:tgtEl>
+                                          <p:spTgt spid="8"/>
+                                        </p:tgtEl>
+                                        <p:attrNameLst>
+                                          <p:attrName>style.visibility</p:attrName>
+                                        </p:attrNameLst>
+                                      </p:cBhvr>
+                                      <p:to>
+                                        <p:strVal val="visible"/>
+                                      </p:to>
+                                    </p:set>
+                                  </p:childTnLst>
+                                </p:cTn>
+                              </p:par>
+                            </p:childTnLst>
+                          </p:cTn>
+                        </p:par>
+                      </p:childTnLst>
+                    </p:cTn>
+                  </p:par>
+                  <p:par>
+                    <p:cTn id="23" fill="hold">
+                      <p:stCondLst>
+                        <p:cond delay="indefinite"/>
+                      </p:stCondLst>
+                      <p:childTnLst>
+                        <p:par>
+                          <p:cTn id="24" fill="hold">
+                            <p:stCondLst>
+                              <p:cond delay="0"/>
+                            </p:stCondLst>
+                            <p:childTnLst>
+                              <p:par>
+                                <p:cTn id="25" presetID="1" presetClass="entr" presetSubtype="0" fill="hold" nodeType="clickEffect">
+                                  <p:stCondLst>
+                                    <p:cond delay="0"/>
+                                  </p:stCondLst>
+                                  <p:childTnLst>
+                                    <p:set>
+                                      <p:cBhvr>
+                                        <p:cTn id="26" dur="1" fill="hold">
+                                          <p:stCondLst>
+                                            <p:cond delay="0"/>
+                                          </p:stCondLst>
+                                        </p:cTn>
+                                        <p:tgtEl>
+                                          <p:spTgt spid="9"/>
                                         </p:tgtEl>
                                         <p:attrNameLst>
                                           <p:attrName>style.visibility</p:attrName>
@@ -36002,614 +35833,6 @@
                 <a:latin typeface="Segoe UI" panose="020B0502040204020203" pitchFamily="34" charset="0"/>
                 <a:cs typeface="Segoe UI" panose="020B0502040204020203" pitchFamily="34" charset="0"/>
               </a:rPr>
-              <a:t>Rewrite the eigenvalue relationship: </a:t>
-            </a:r>
-          </a:p>
-          <a:p>
-            <a:endParaRPr lang="en-US" sz="2800" dirty="0">
-              <a:latin typeface="Segoe UI" panose="020B0502040204020203" pitchFamily="34" charset="0"/>
-              <a:cs typeface="Segoe UI" panose="020B0502040204020203" pitchFamily="34" charset="0"/>
-            </a:endParaRPr>
-          </a:p>
-          <a:p>
-            <a:endParaRPr lang="en-US" sz="2800" dirty="0">
-              <a:latin typeface="Segoe UI" panose="020B0502040204020203" pitchFamily="34" charset="0"/>
-              <a:cs typeface="Segoe UI" panose="020B0502040204020203" pitchFamily="34" charset="0"/>
-            </a:endParaRPr>
-          </a:p>
-          <a:p>
-            <a:endParaRPr lang="en-US" sz="2800" dirty="0">
-              <a:latin typeface="Segoe UI" panose="020B0502040204020203" pitchFamily="34" charset="0"/>
-              <a:cs typeface="Segoe UI" panose="020B0502040204020203" pitchFamily="34" charset="0"/>
-            </a:endParaRPr>
-          </a:p>
-          <a:p>
-            <a:endParaRPr lang="en-US" sz="2800" dirty="0">
-              <a:latin typeface="Segoe UI" panose="020B0502040204020203" pitchFamily="34" charset="0"/>
-              <a:cs typeface="Segoe UI" panose="020B0502040204020203" pitchFamily="34" charset="0"/>
-            </a:endParaRPr>
-          </a:p>
-          <a:p>
-            <a:r>
-              <a:rPr lang="en-US" sz="2800" dirty="0">
-                <a:latin typeface="Segoe UI" panose="020B0502040204020203" pitchFamily="34" charset="0"/>
-                <a:cs typeface="Segoe UI" panose="020B0502040204020203" pitchFamily="34" charset="0"/>
-              </a:rPr>
-              <a:t>To see that </a:t>
-            </a:r>
-            <a:r>
-              <a:rPr lang="en-US" sz="2800" dirty="0">
-                <a:latin typeface="Symbol" panose="05050102010706020507" pitchFamily="18" charset="2"/>
-                <a:cs typeface="Segoe UI" panose="020B0502040204020203" pitchFamily="34" charset="0"/>
-              </a:rPr>
-              <a:t>l</a:t>
-            </a:r>
-            <a:r>
-              <a:rPr lang="en-US" sz="2800" dirty="0">
-                <a:latin typeface="Segoe UI" panose="020B0502040204020203" pitchFamily="34" charset="0"/>
-                <a:cs typeface="Segoe UI" panose="020B0502040204020203" pitchFamily="34" charset="0"/>
-              </a:rPr>
-              <a:t> is a root of </a:t>
-            </a:r>
-            <a:r>
-              <a:rPr lang="en-US" sz="2800" i="1" dirty="0">
-                <a:latin typeface="Segoe UI" panose="020B0502040204020203" pitchFamily="34" charset="0"/>
-                <a:cs typeface="Segoe UI" panose="020B0502040204020203" pitchFamily="34" charset="0"/>
-              </a:rPr>
-              <a:t>A</a:t>
-            </a:r>
-            <a:r>
-              <a:rPr lang="en-US" sz="2800" dirty="0">
-                <a:latin typeface="Segoe UI" panose="020B0502040204020203" pitchFamily="34" charset="0"/>
-                <a:cs typeface="Segoe UI" panose="020B0502040204020203" pitchFamily="34" charset="0"/>
-              </a:rPr>
-              <a:t> we can rearrange as follows: </a:t>
-            </a:r>
-          </a:p>
-        </p:txBody>
-      </p:sp>
-      <p:pic>
-        <p:nvPicPr>
-          <p:cNvPr id="7" name="Picture 6">
-            <a:extLst>
-              <a:ext uri="{FF2B5EF4-FFF2-40B4-BE49-F238E27FC236}">
-                <a16:creationId xmlns:a16="http://schemas.microsoft.com/office/drawing/2014/main" id="{9AEA1668-3240-481F-9ADA-8EBE27A38FC1}"/>
-              </a:ext>
-            </a:extLst>
-          </p:cNvPr>
-          <p:cNvPicPr>
-            <a:picLocks noChangeAspect="1"/>
-          </p:cNvPicPr>
-          <p:nvPr/>
-        </p:nvPicPr>
-        <p:blipFill>
-          <a:blip r:embed="rId2"/>
-          <a:stretch>
-            <a:fillRect/>
-          </a:stretch>
-        </p:blipFill>
-        <p:spPr>
-          <a:xfrm>
-            <a:off x="1114391" y="2602221"/>
-            <a:ext cx="1554513" cy="388629"/>
-          </a:xfrm>
-          <a:prstGeom prst="rect">
-            <a:avLst/>
-          </a:prstGeom>
-        </p:spPr>
-      </p:pic>
-      <p:pic>
-        <p:nvPicPr>
-          <p:cNvPr id="4" name="Picture 3">
-            <a:extLst>
-              <a:ext uri="{FF2B5EF4-FFF2-40B4-BE49-F238E27FC236}">
-                <a16:creationId xmlns:a16="http://schemas.microsoft.com/office/drawing/2014/main" id="{DB7ECF0E-4535-45CF-9C92-AF8E6CAD2A2C}"/>
-              </a:ext>
-            </a:extLst>
-          </p:cNvPr>
-          <p:cNvPicPr>
-            <a:picLocks noChangeAspect="1"/>
-          </p:cNvPicPr>
-          <p:nvPr/>
-        </p:nvPicPr>
-        <p:blipFill>
-          <a:blip r:embed="rId3"/>
-          <a:stretch>
-            <a:fillRect/>
-          </a:stretch>
-        </p:blipFill>
-        <p:spPr>
-          <a:xfrm>
-            <a:off x="1114391" y="3185218"/>
-            <a:ext cx="5064260" cy="1775402"/>
-          </a:xfrm>
-          <a:prstGeom prst="rect">
-            <a:avLst/>
-          </a:prstGeom>
-        </p:spPr>
-      </p:pic>
-      <p:pic>
-        <p:nvPicPr>
-          <p:cNvPr id="8" name="Picture 7">
-            <a:extLst>
-              <a:ext uri="{FF2B5EF4-FFF2-40B4-BE49-F238E27FC236}">
-                <a16:creationId xmlns:a16="http://schemas.microsoft.com/office/drawing/2014/main" id="{780533CD-4735-4F33-89BD-8EFA70FAB233}"/>
-              </a:ext>
-            </a:extLst>
-          </p:cNvPr>
-          <p:cNvPicPr>
-            <a:picLocks noChangeAspect="1"/>
-          </p:cNvPicPr>
-          <p:nvPr/>
-        </p:nvPicPr>
-        <p:blipFill>
-          <a:blip r:embed="rId4"/>
-          <a:stretch>
-            <a:fillRect/>
-          </a:stretch>
-        </p:blipFill>
-        <p:spPr>
-          <a:xfrm>
-            <a:off x="3593763" y="5611626"/>
-            <a:ext cx="2446991" cy="341043"/>
-          </a:xfrm>
-          <a:prstGeom prst="rect">
-            <a:avLst/>
-          </a:prstGeom>
-        </p:spPr>
-      </p:pic>
-      <p:pic>
-        <p:nvPicPr>
-          <p:cNvPr id="9" name="Picture 8">
-            <a:extLst>
-              <a:ext uri="{FF2B5EF4-FFF2-40B4-BE49-F238E27FC236}">
-                <a16:creationId xmlns:a16="http://schemas.microsoft.com/office/drawing/2014/main" id="{A5F4DAA7-9F50-47C2-9B46-BABFA5B1ABF3}"/>
-              </a:ext>
-            </a:extLst>
-          </p:cNvPr>
-          <p:cNvPicPr>
-            <a:picLocks noChangeAspect="1"/>
-          </p:cNvPicPr>
-          <p:nvPr/>
-        </p:nvPicPr>
-        <p:blipFill>
-          <a:blip r:embed="rId5"/>
-          <a:stretch>
-            <a:fillRect/>
-          </a:stretch>
-        </p:blipFill>
-        <p:spPr>
-          <a:xfrm>
-            <a:off x="3395696" y="6056341"/>
-            <a:ext cx="2597382" cy="413039"/>
-          </a:xfrm>
-          <a:prstGeom prst="rect">
-            <a:avLst/>
-          </a:prstGeom>
-        </p:spPr>
-      </p:pic>
-    </p:spTree>
-    <p:extLst>
-      <p:ext uri="{BB962C8B-B14F-4D97-AF65-F5344CB8AC3E}">
-        <p14:creationId xmlns:p14="http://schemas.microsoft.com/office/powerpoint/2010/main" val="3740570824"/>
-      </p:ext>
-    </p:extLst>
-  </p:cSld>
-  <p:clrMapOvr>
-    <a:masterClrMapping/>
-  </p:clrMapOvr>
-  <p:timing>
-    <p:tnLst>
-      <p:par>
-        <p:cTn id="1" dur="indefinite" restart="never" nodeType="tmRoot">
-          <p:childTnLst>
-            <p:seq concurrent="1" nextAc="seek">
-              <p:cTn id="2" dur="indefinite" nodeType="mainSeq">
-                <p:childTnLst>
-                  <p:par>
-                    <p:cTn id="3" fill="hold">
-                      <p:stCondLst>
-                        <p:cond delay="indefinite"/>
-                      </p:stCondLst>
-                      <p:childTnLst>
-                        <p:par>
-                          <p:cTn id="4" fill="hold">
-                            <p:stCondLst>
-                              <p:cond delay="0"/>
-                            </p:stCondLst>
-                            <p:childTnLst>
-                              <p:par>
-                                <p:cTn id="5" presetID="1" presetClass="entr" presetSubtype="0" fill="hold" grpId="0" nodeType="clickEffect">
-                                  <p:stCondLst>
-                                    <p:cond delay="0"/>
-                                  </p:stCondLst>
-                                  <p:childTnLst>
-                                    <p:set>
-                                      <p:cBhvr>
-                                        <p:cTn id="6" dur="1" fill="hold">
-                                          <p:stCondLst>
-                                            <p:cond delay="0"/>
-                                          </p:stCondLst>
-                                        </p:cTn>
-                                        <p:tgtEl>
-                                          <p:spTgt spid="3">
-                                            <p:txEl>
-                                              <p:pRg st="1" end="1"/>
-                                            </p:txEl>
-                                          </p:spTgt>
-                                        </p:tgtEl>
-                                        <p:attrNameLst>
-                                          <p:attrName>style.visibility</p:attrName>
-                                        </p:attrNameLst>
-                                      </p:cBhvr>
-                                      <p:to>
-                                        <p:strVal val="visible"/>
-                                      </p:to>
-                                    </p:set>
-                                  </p:childTnLst>
-                                </p:cTn>
-                              </p:par>
-                            </p:childTnLst>
-                          </p:cTn>
-                        </p:par>
-                      </p:childTnLst>
-                    </p:cTn>
-                  </p:par>
-                  <p:par>
-                    <p:cTn id="7" fill="hold">
-                      <p:stCondLst>
-                        <p:cond delay="indefinite"/>
-                      </p:stCondLst>
-                      <p:childTnLst>
-                        <p:par>
-                          <p:cTn id="8" fill="hold">
-                            <p:stCondLst>
-                              <p:cond delay="0"/>
-                            </p:stCondLst>
-                            <p:childTnLst>
-                              <p:par>
-                                <p:cTn id="9" presetID="1" presetClass="entr" presetSubtype="0" fill="hold" nodeType="clickEffect">
-                                  <p:stCondLst>
-                                    <p:cond delay="0"/>
-                                  </p:stCondLst>
-                                  <p:childTnLst>
-                                    <p:set>
-                                      <p:cBhvr>
-                                        <p:cTn id="10" dur="1" fill="hold">
-                                          <p:stCondLst>
-                                            <p:cond delay="0"/>
-                                          </p:stCondLst>
-                                        </p:cTn>
-                                        <p:tgtEl>
-                                          <p:spTgt spid="7"/>
-                                        </p:tgtEl>
-                                        <p:attrNameLst>
-                                          <p:attrName>style.visibility</p:attrName>
-                                        </p:attrNameLst>
-                                      </p:cBhvr>
-                                      <p:to>
-                                        <p:strVal val="visible"/>
-                                      </p:to>
-                                    </p:set>
-                                  </p:childTnLst>
-                                </p:cTn>
-                              </p:par>
-                            </p:childTnLst>
-                          </p:cTn>
-                        </p:par>
-                      </p:childTnLst>
-                    </p:cTn>
-                  </p:par>
-                  <p:par>
-                    <p:cTn id="11" fill="hold">
-                      <p:stCondLst>
-                        <p:cond delay="indefinite"/>
-                      </p:stCondLst>
-                      <p:childTnLst>
-                        <p:par>
-                          <p:cTn id="12" fill="hold">
-                            <p:stCondLst>
-                              <p:cond delay="0"/>
-                            </p:stCondLst>
-                            <p:childTnLst>
-                              <p:par>
-                                <p:cTn id="13" presetID="1" presetClass="entr" presetSubtype="0" fill="hold" nodeType="clickEffect">
-                                  <p:stCondLst>
-                                    <p:cond delay="0"/>
-                                  </p:stCondLst>
-                                  <p:childTnLst>
-                                    <p:set>
-                                      <p:cBhvr>
-                                        <p:cTn id="14" dur="1" fill="hold">
-                                          <p:stCondLst>
-                                            <p:cond delay="0"/>
-                                          </p:stCondLst>
-                                        </p:cTn>
-                                        <p:tgtEl>
-                                          <p:spTgt spid="4"/>
-                                        </p:tgtEl>
-                                        <p:attrNameLst>
-                                          <p:attrName>style.visibility</p:attrName>
-                                        </p:attrNameLst>
-                                      </p:cBhvr>
-                                      <p:to>
-                                        <p:strVal val="visible"/>
-                                      </p:to>
-                                    </p:set>
-                                  </p:childTnLst>
-                                </p:cTn>
-                              </p:par>
-                            </p:childTnLst>
-                          </p:cTn>
-                        </p:par>
-                      </p:childTnLst>
-                    </p:cTn>
-                  </p:par>
-                  <p:par>
-                    <p:cTn id="15" fill="hold">
-                      <p:stCondLst>
-                        <p:cond delay="indefinite"/>
-                      </p:stCondLst>
-                      <p:childTnLst>
-                        <p:par>
-                          <p:cTn id="16" fill="hold">
-                            <p:stCondLst>
-                              <p:cond delay="0"/>
-                            </p:stCondLst>
-                            <p:childTnLst>
-                              <p:par>
-                                <p:cTn id="17" presetID="1" presetClass="entr" presetSubtype="0" fill="hold" grpId="0" nodeType="clickEffect">
-                                  <p:stCondLst>
-                                    <p:cond delay="0"/>
-                                  </p:stCondLst>
-                                  <p:childTnLst>
-                                    <p:set>
-                                      <p:cBhvr>
-                                        <p:cTn id="18" dur="1" fill="hold">
-                                          <p:stCondLst>
-                                            <p:cond delay="0"/>
-                                          </p:stCondLst>
-                                        </p:cTn>
-                                        <p:tgtEl>
-                                          <p:spTgt spid="3">
-                                            <p:txEl>
-                                              <p:pRg st="6" end="6"/>
-                                            </p:txEl>
-                                          </p:spTgt>
-                                        </p:tgtEl>
-                                        <p:attrNameLst>
-                                          <p:attrName>style.visibility</p:attrName>
-                                        </p:attrNameLst>
-                                      </p:cBhvr>
-                                      <p:to>
-                                        <p:strVal val="visible"/>
-                                      </p:to>
-                                    </p:set>
-                                  </p:childTnLst>
-                                </p:cTn>
-                              </p:par>
-                            </p:childTnLst>
-                          </p:cTn>
-                        </p:par>
-                      </p:childTnLst>
-                    </p:cTn>
-                  </p:par>
-                  <p:par>
-                    <p:cTn id="19" fill="hold">
-                      <p:stCondLst>
-                        <p:cond delay="indefinite"/>
-                      </p:stCondLst>
-                      <p:childTnLst>
-                        <p:par>
-                          <p:cTn id="20" fill="hold">
-                            <p:stCondLst>
-                              <p:cond delay="0"/>
-                            </p:stCondLst>
-                            <p:childTnLst>
-                              <p:par>
-                                <p:cTn id="21" presetID="1" presetClass="entr" presetSubtype="0" fill="hold" nodeType="clickEffect">
-                                  <p:stCondLst>
-                                    <p:cond delay="0"/>
-                                  </p:stCondLst>
-                                  <p:childTnLst>
-                                    <p:set>
-                                      <p:cBhvr>
-                                        <p:cTn id="22" dur="1" fill="hold">
-                                          <p:stCondLst>
-                                            <p:cond delay="0"/>
-                                          </p:stCondLst>
-                                        </p:cTn>
-                                        <p:tgtEl>
-                                          <p:spTgt spid="8"/>
-                                        </p:tgtEl>
-                                        <p:attrNameLst>
-                                          <p:attrName>style.visibility</p:attrName>
-                                        </p:attrNameLst>
-                                      </p:cBhvr>
-                                      <p:to>
-                                        <p:strVal val="visible"/>
-                                      </p:to>
-                                    </p:set>
-                                  </p:childTnLst>
-                                </p:cTn>
-                              </p:par>
-                            </p:childTnLst>
-                          </p:cTn>
-                        </p:par>
-                      </p:childTnLst>
-                    </p:cTn>
-                  </p:par>
-                  <p:par>
-                    <p:cTn id="23" fill="hold">
-                      <p:stCondLst>
-                        <p:cond delay="indefinite"/>
-                      </p:stCondLst>
-                      <p:childTnLst>
-                        <p:par>
-                          <p:cTn id="24" fill="hold">
-                            <p:stCondLst>
-                              <p:cond delay="0"/>
-                            </p:stCondLst>
-                            <p:childTnLst>
-                              <p:par>
-                                <p:cTn id="25" presetID="1" presetClass="entr" presetSubtype="0" fill="hold" nodeType="clickEffect">
-                                  <p:stCondLst>
-                                    <p:cond delay="0"/>
-                                  </p:stCondLst>
-                                  <p:childTnLst>
-                                    <p:set>
-                                      <p:cBhvr>
-                                        <p:cTn id="26" dur="1" fill="hold">
-                                          <p:stCondLst>
-                                            <p:cond delay="0"/>
-                                          </p:stCondLst>
-                                        </p:cTn>
-                                        <p:tgtEl>
-                                          <p:spTgt spid="9"/>
-                                        </p:tgtEl>
-                                        <p:attrNameLst>
-                                          <p:attrName>style.visibility</p:attrName>
-                                        </p:attrNameLst>
-                                      </p:cBhvr>
-                                      <p:to>
-                                        <p:strVal val="visible"/>
-                                      </p:to>
-                                    </p:set>
-                                  </p:childTnLst>
-                                </p:cTn>
-                              </p:par>
-                            </p:childTnLst>
-                          </p:cTn>
-                        </p:par>
-                      </p:childTnLst>
-                    </p:cTn>
-                  </p:par>
-                </p:childTnLst>
-              </p:cTn>
-              <p:prevCondLst>
-                <p:cond evt="onPrev" delay="0">
-                  <p:tgtEl>
-                    <p:sldTgt/>
-                  </p:tgtEl>
-                </p:cond>
-              </p:prevCondLst>
-              <p:nextCondLst>
-                <p:cond evt="onNext" delay="0">
-                  <p:tgtEl>
-                    <p:sldTgt/>
-                  </p:tgtEl>
-                </p:cond>
-              </p:nextCondLst>
-            </p:seq>
-          </p:childTnLst>
-        </p:cTn>
-      </p:par>
-    </p:tnLst>
-    <p:bldLst>
-      <p:bldP spid="3" grpId="0" uiExpand="1" build="p"/>
-    </p:bldLst>
-  </p:timing>
-</p:sld>
-</file>
-
-<file path=ppt/slides/slide51.xml><?xml version="1.0" encoding="utf-8"?>
-<p:sld xmlns:a="http://schemas.openxmlformats.org/drawingml/2006/main" xmlns:r="http://schemas.openxmlformats.org/officeDocument/2006/relationships" xmlns:p="http://schemas.openxmlformats.org/presentationml/2006/main">
-  <p:cSld>
-    <p:spTree>
-      <p:nvGrpSpPr>
-        <p:cNvPr id="1" name=""/>
-        <p:cNvGrpSpPr/>
-        <p:nvPr/>
-      </p:nvGrpSpPr>
-      <p:grpSpPr>
-        <a:xfrm>
-          <a:off x="0" y="0"/>
-          <a:ext cx="0" cy="0"/>
-          <a:chOff x="0" y="0"/>
-          <a:chExt cx="0" cy="0"/>
-        </a:xfrm>
-      </p:grpSpPr>
-      <p:sp>
-        <p:nvSpPr>
-          <p:cNvPr id="2" name="Title 1">
-            <a:extLst>
-              <a:ext uri="{FF2B5EF4-FFF2-40B4-BE49-F238E27FC236}">
-                <a16:creationId xmlns:a16="http://schemas.microsoft.com/office/drawing/2014/main" id="{2E28F462-DC1F-48AF-8BA3-5D8B887182ED}"/>
-              </a:ext>
-            </a:extLst>
-          </p:cNvPr>
-          <p:cNvSpPr>
-            <a:spLocks noGrp="1"/>
-          </p:cNvSpPr>
-          <p:nvPr>
-            <p:ph type="title"/>
-          </p:nvPr>
-        </p:nvSpPr>
-        <p:spPr/>
-        <p:txBody>
-          <a:bodyPr/>
-          <a:lstStyle/>
-          <a:p>
-            <a:r>
-              <a:rPr lang="en-US" dirty="0">
-                <a:latin typeface="Segoe UI" panose="020B0502040204020203" pitchFamily="34" charset="0"/>
-                <a:cs typeface="Segoe UI" panose="020B0502040204020203" pitchFamily="34" charset="0"/>
-              </a:rPr>
-              <a:t>Review of Eigenvalues</a:t>
-            </a:r>
-          </a:p>
-        </p:txBody>
-      </p:sp>
-      <p:sp>
-        <p:nvSpPr>
-          <p:cNvPr id="3" name="Content Placeholder 2">
-            <a:extLst>
-              <a:ext uri="{FF2B5EF4-FFF2-40B4-BE49-F238E27FC236}">
-                <a16:creationId xmlns:a16="http://schemas.microsoft.com/office/drawing/2014/main" id="{6948E274-B4C9-49D5-BB15-6A382137E2DD}"/>
-              </a:ext>
-            </a:extLst>
-          </p:cNvPr>
-          <p:cNvSpPr>
-            <a:spLocks noGrp="1"/>
-          </p:cNvSpPr>
-          <p:nvPr>
-            <p:ph sz="quarter" idx="10"/>
-          </p:nvPr>
-        </p:nvSpPr>
-        <p:spPr>
-          <a:xfrm>
-            <a:off x="379514" y="872411"/>
-            <a:ext cx="11525250" cy="5803374"/>
-          </a:xfrm>
-        </p:spPr>
-        <p:txBody>
-          <a:bodyPr/>
-          <a:lstStyle/>
-          <a:p>
-            <a:pPr marL="0" indent="0">
-              <a:buNone/>
-            </a:pPr>
-            <a:r>
-              <a:rPr lang="en-US" b="1" dirty="0">
-                <a:latin typeface="Segoe UI" panose="020B0502040204020203" pitchFamily="34" charset="0"/>
-                <a:cs typeface="Segoe UI" panose="020B0502040204020203" pitchFamily="34" charset="0"/>
-              </a:rPr>
-              <a:t>Eigenvalues</a:t>
-            </a:r>
-            <a:r>
-              <a:rPr lang="en-US" dirty="0">
-                <a:latin typeface="Segoe UI" panose="020B0502040204020203" pitchFamily="34" charset="0"/>
-                <a:cs typeface="Segoe UI" panose="020B0502040204020203" pitchFamily="34" charset="0"/>
-              </a:rPr>
-              <a:t> are characteristic roots or characteristic values of a linear system</a:t>
-            </a:r>
-          </a:p>
-          <a:p>
-            <a:r>
-              <a:rPr lang="en-US" sz="2800" dirty="0">
-                <a:latin typeface="Segoe UI" panose="020B0502040204020203" pitchFamily="34" charset="0"/>
-                <a:cs typeface="Segoe UI" panose="020B0502040204020203" pitchFamily="34" charset="0"/>
-              </a:rPr>
               <a:t>An n x n matrix A will have </a:t>
             </a:r>
             <a:r>
@@ -37118,7 +36341,7 @@
 </p:sld>
 </file>
 
-<file path=ppt/slides/slide52.xml><?xml version="1.0" encoding="utf-8"?>
+<file path=ppt/slides/slide51.xml><?xml version="1.0" encoding="utf-8"?>
 <p:sld xmlns:a="http://schemas.openxmlformats.org/drawingml/2006/main" xmlns:r="http://schemas.openxmlformats.org/officeDocument/2006/relationships" xmlns:p="http://schemas.openxmlformats.org/presentationml/2006/main">
   <p:cSld>
     <p:spTree>
@@ -37682,7 +36905,7 @@
 </p:sld>
 </file>
 
-<file path=ppt/slides/slide53.xml><?xml version="1.0" encoding="utf-8"?>
+<file path=ppt/slides/slide52.xml><?xml version="1.0" encoding="utf-8"?>
 <p:sld xmlns:a="http://schemas.openxmlformats.org/drawingml/2006/main" xmlns:r="http://schemas.openxmlformats.org/officeDocument/2006/relationships" xmlns:p="http://schemas.openxmlformats.org/presentationml/2006/main">
   <p:cSld>
     <p:spTree>
@@ -38232,7 +37455,7 @@
 </p:sld>
 </file>
 
-<file path=ppt/slides/slide54.xml><?xml version="1.0" encoding="utf-8"?>
+<file path=ppt/slides/slide53.xml><?xml version="1.0" encoding="utf-8"?>
 <p:sld xmlns:a="http://schemas.openxmlformats.org/drawingml/2006/main" xmlns:r="http://schemas.openxmlformats.org/officeDocument/2006/relationships" xmlns:p="http://schemas.openxmlformats.org/presentationml/2006/main">
   <p:cSld>
     <p:spTree>
@@ -38872,7 +38095,7 @@
 </p:sld>
 </file>
 
-<file path=ppt/slides/slide55.xml><?xml version="1.0" encoding="utf-8"?>
+<file path=ppt/slides/slide54.xml><?xml version="1.0" encoding="utf-8"?>
 <p:sld xmlns:a="http://schemas.openxmlformats.org/drawingml/2006/main" xmlns:r="http://schemas.openxmlformats.org/officeDocument/2006/relationships" xmlns:p="http://schemas.openxmlformats.org/presentationml/2006/main">
   <p:cSld>
     <p:spTree>
@@ -44339,6 +43562,21 @@
 </file>
 
 <file path=customXml/item1.xml><?xml version="1.0" encoding="utf-8"?>
+<?mso-contentType ?>
+<FormTemplates xmlns="http://schemas.microsoft.com/sharepoint/v3/contenttype/forms">
+  <Display>DocumentLibraryForm</Display>
+  <Edit>DocumentLibraryForm</Edit>
+  <New>DocumentLibraryForm</New>
+</FormTemplates>
+</file>
+
+<file path=customXml/item2.xml><?xml version="1.0" encoding="utf-8"?>
+<p:properties xmlns:p="http://schemas.microsoft.com/office/2006/metadata/properties" xmlns:xsi="http://www.w3.org/2001/XMLSchema-instance" xmlns:pc="http://schemas.microsoft.com/office/infopath/2007/PartnerControls">
+  <documentManagement/>
+</p:properties>
+</file>
+
+<file path=customXml/item3.xml><?xml version="1.0" encoding="utf-8"?>
 <ct:contentTypeSchema xmlns:ct="http://schemas.microsoft.com/office/2006/metadata/contentType" xmlns:ma="http://schemas.microsoft.com/office/2006/metadata/properties/metaAttributes" ct:_="" ma:_="" ma:contentTypeName="Document" ma:contentTypeID="0x010100391E57C78B9F604FB8BAD296D1460E2A" ma:contentTypeVersion="1" ma:contentTypeDescription="Create a new document." ma:contentTypeScope="" ma:versionID="fb382fe2362acd2155f454904f478e4d">
   <xsd:schema xmlns:xsd="http://www.w3.org/2001/XMLSchema" xmlns:xs="http://www.w3.org/2001/XMLSchema" xmlns:p="http://schemas.microsoft.com/office/2006/metadata/properties" xmlns:ns3="636b0322-90fb-440c-9cbc-22749e7231e9" targetNamespace="http://schemas.microsoft.com/office/2006/metadata/properties" ma:root="true" ma:fieldsID="b9887c63ce4710c1aeb75a5f03aecb69" ns3:_="">
     <xsd:import namespace="636b0322-90fb-440c-9cbc-22749e7231e9"/>
@@ -44478,22 +43716,31 @@
 </ct:contentTypeSchema>
 </file>
 
-<file path=customXml/item2.xml><?xml version="1.0" encoding="utf-8"?>
-<?mso-contentType ?>
-<FormTemplates xmlns="http://schemas.microsoft.com/sharepoint/v3/contenttype/forms">
-  <Display>DocumentLibraryForm</Display>
-  <Edit>DocumentLibraryForm</Edit>
-  <New>DocumentLibraryForm</New>
-</FormTemplates>
+<file path=customXml/itemProps1.xml><?xml version="1.0" encoding="utf-8"?>
+<ds:datastoreItem xmlns:ds="http://schemas.openxmlformats.org/officeDocument/2006/customXml" ds:itemID="{B0CA13EC-1D3C-4D6F-8D1C-E8A452CFC79A}">
+  <ds:schemaRefs>
+    <ds:schemaRef ds:uri="http://schemas.microsoft.com/sharepoint/v3/contenttype/forms"/>
+  </ds:schemaRefs>
+</ds:datastoreItem>
 </file>
 
-<file path=customXml/item3.xml><?xml version="1.0" encoding="utf-8"?>
-<p:properties xmlns:p="http://schemas.microsoft.com/office/2006/metadata/properties" xmlns:xsi="http://www.w3.org/2001/XMLSchema-instance" xmlns:pc="http://schemas.microsoft.com/office/infopath/2007/PartnerControls">
-  <documentManagement/>
-</p:properties>
+<file path=customXml/itemProps2.xml><?xml version="1.0" encoding="utf-8"?>
+<ds:datastoreItem xmlns:ds="http://schemas.openxmlformats.org/officeDocument/2006/customXml" ds:itemID="{7025FDD9-4C58-4084-9F89-0E6ADD6FFF55}">
+  <ds:schemaRefs>
+    <ds:schemaRef ds:uri="http://purl.org/dc/terms/"/>
+    <ds:schemaRef ds:uri="http://schemas.microsoft.com/office/2006/documentManagement/types"/>
+    <ds:schemaRef ds:uri="636b0322-90fb-440c-9cbc-22749e7231e9"/>
+    <ds:schemaRef ds:uri="http://purl.org/dc/elements/1.1/"/>
+    <ds:schemaRef ds:uri="http://schemas.microsoft.com/office/2006/metadata/properties"/>
+    <ds:schemaRef ds:uri="http://schemas.microsoft.com/office/infopath/2007/PartnerControls"/>
+    <ds:schemaRef ds:uri="http://schemas.openxmlformats.org/package/2006/metadata/core-properties"/>
+    <ds:schemaRef ds:uri="http://www.w3.org/XML/1998/namespace"/>
+    <ds:schemaRef ds:uri="http://purl.org/dc/dcmitype/"/>
+  </ds:schemaRefs>
+</ds:datastoreItem>
 </file>
 
-<file path=customXml/itemProps1.xml><?xml version="1.0" encoding="utf-8"?>
+<file path=customXml/itemProps3.xml><?xml version="1.0" encoding="utf-8"?>
 <ds:datastoreItem xmlns:ds="http://schemas.openxmlformats.org/officeDocument/2006/customXml" ds:itemID="{C6DB243D-F585-435F-A2EA-E3678FDD33D9}">
   <ds:schemaRefs>
     <ds:schemaRef ds:uri="http://schemas.microsoft.com/office/2006/metadata/contentType"/>
@@ -44509,28 +43756,4 @@
     <ds:schemaRef ds:uri="http://schemas.microsoft.com/internal/obd"/>
   </ds:schemaRefs>
 </ds:datastoreItem>
-</file>
-
-<file path=customXml/itemProps2.xml><?xml version="1.0" encoding="utf-8"?>
-<ds:datastoreItem xmlns:ds="http://schemas.openxmlformats.org/officeDocument/2006/customXml" ds:itemID="{B0CA13EC-1D3C-4D6F-8D1C-E8A452CFC79A}">
-  <ds:schemaRefs>
-    <ds:schemaRef ds:uri="http://schemas.microsoft.com/sharepoint/v3/contenttype/forms"/>
-  </ds:schemaRefs>
-</ds:datastoreItem>
-</file>
-
-<file path=customXml/itemProps3.xml><?xml version="1.0" encoding="utf-8"?>
-<ds:datastoreItem xmlns:ds="http://schemas.openxmlformats.org/officeDocument/2006/customXml" ds:itemID="{7025FDD9-4C58-4084-9F89-0E6ADD6FFF55}">
-  <ds:schemaRefs>
-    <ds:schemaRef ds:uri="http://purl.org/dc/terms/"/>
-    <ds:schemaRef ds:uri="http://schemas.microsoft.com/office/2006/documentManagement/types"/>
-    <ds:schemaRef ds:uri="636b0322-90fb-440c-9cbc-22749e7231e9"/>
-    <ds:schemaRef ds:uri="http://purl.org/dc/elements/1.1/"/>
-    <ds:schemaRef ds:uri="http://schemas.microsoft.com/office/2006/metadata/properties"/>
-    <ds:schemaRef ds:uri="http://schemas.microsoft.com/office/infopath/2007/PartnerControls"/>
-    <ds:schemaRef ds:uri="http://schemas.openxmlformats.org/package/2006/metadata/core-properties"/>
-    <ds:schemaRef ds:uri="http://www.w3.org/XML/1998/namespace"/>
-    <ds:schemaRef ds:uri="http://purl.org/dc/dcmitype/"/>
-  </ds:schemaRefs>
-</ds:datastoreItem>
 </file>
</xml_diff>

<commit_message>
Updates from section meeting review of optimization
</commit_message>
<xml_diff>
--- a/SuplementaryMaterial/OptimizationForDeepLearning.pptx
+++ b/SuplementaryMaterial/OptimizationForDeepLearning.pptx
@@ -25992,8 +25992,8 @@
         </p:blipFill>
         <p:spPr>
           <a:xfrm>
-            <a:off x="1904048" y="2884363"/>
-            <a:ext cx="3763225" cy="407622"/>
+            <a:off x="2075103" y="2902892"/>
+            <a:ext cx="3421114" cy="370565"/>
           </a:xfrm>
           <a:prstGeom prst="rect">
             <a:avLst/>
@@ -26397,33 +26397,15 @@
                                   </p:childTnLst>
                                 </p:cTn>
                               </p:par>
-                            </p:childTnLst>
-                          </p:cTn>
-                        </p:par>
-                      </p:childTnLst>
-                    </p:cTn>
-                  </p:par>
-                  <p:par>
-                    <p:cTn id="15" fill="hold">
-                      <p:stCondLst>
-                        <p:cond delay="indefinite"/>
-                      </p:stCondLst>
-                      <p:childTnLst>
-                        <p:par>
-                          <p:cTn id="16" fill="hold">
-                            <p:stCondLst>
-                              <p:cond delay="0"/>
-                            </p:stCondLst>
-                            <p:childTnLst>
                               <p:par>
-                                <p:cTn id="17" presetID="1" presetClass="entr" presetSubtype="0" fill="hold" nodeType="clickEffect">
+                                <p:cTn id="15" presetID="1" presetClass="entr" presetSubtype="0" fill="hold" nodeType="withEffect">
                                   <p:stCondLst>
                                     <p:cond delay="0"/>
                                   </p:stCondLst>
                                   <p:childTnLst>
                                     <p:set>
                                       <p:cBhvr>
-                                        <p:cTn id="18" dur="1" fill="hold">
+                                        <p:cTn id="16" dur="1" fill="hold">
                                           <p:stCondLst>
                                             <p:cond delay="0"/>
                                           </p:stCondLst>
@@ -26442,33 +26424,15 @@
                                   </p:childTnLst>
                                 </p:cTn>
                               </p:par>
-                            </p:childTnLst>
-                          </p:cTn>
-                        </p:par>
-                      </p:childTnLst>
-                    </p:cTn>
-                  </p:par>
-                  <p:par>
-                    <p:cTn id="19" fill="hold">
-                      <p:stCondLst>
-                        <p:cond delay="indefinite"/>
-                      </p:stCondLst>
-                      <p:childTnLst>
-                        <p:par>
-                          <p:cTn id="20" fill="hold">
-                            <p:stCondLst>
-                              <p:cond delay="0"/>
-                            </p:stCondLst>
-                            <p:childTnLst>
                               <p:par>
-                                <p:cTn id="21" presetID="1" presetClass="entr" presetSubtype="0" fill="hold" nodeType="clickEffect">
+                                <p:cTn id="17" presetID="1" presetClass="entr" presetSubtype="0" fill="hold" nodeType="withEffect">
                                   <p:stCondLst>
                                     <p:cond delay="0"/>
                                   </p:stCondLst>
                                   <p:childTnLst>
                                     <p:set>
                                       <p:cBhvr>
-                                        <p:cTn id="22" dur="1" fill="hold">
+                                        <p:cTn id="18" dur="1" fill="hold">
                                           <p:stCondLst>
                                             <p:cond delay="0"/>
                                           </p:stCondLst>
@@ -26487,33 +26451,15 @@
                                   </p:childTnLst>
                                 </p:cTn>
                               </p:par>
-                            </p:childTnLst>
-                          </p:cTn>
-                        </p:par>
-                      </p:childTnLst>
-                    </p:cTn>
-                  </p:par>
-                  <p:par>
-                    <p:cTn id="23" fill="hold">
-                      <p:stCondLst>
-                        <p:cond delay="indefinite"/>
-                      </p:stCondLst>
-                      <p:childTnLst>
-                        <p:par>
-                          <p:cTn id="24" fill="hold">
-                            <p:stCondLst>
-                              <p:cond delay="0"/>
-                            </p:stCondLst>
-                            <p:childTnLst>
                               <p:par>
-                                <p:cTn id="25" presetID="1" presetClass="entr" presetSubtype="0" fill="hold" nodeType="clickEffect">
+                                <p:cTn id="19" presetID="1" presetClass="entr" presetSubtype="0" fill="hold" nodeType="withEffect">
                                   <p:stCondLst>
                                     <p:cond delay="0"/>
                                   </p:stCondLst>
                                   <p:childTnLst>
                                     <p:set>
                                       <p:cBhvr>
-                                        <p:cTn id="26" dur="1" fill="hold">
+                                        <p:cTn id="20" dur="1" fill="hold">
                                           <p:stCondLst>
                                             <p:cond delay="0"/>
                                           </p:stCondLst>
@@ -26539,26 +26485,26 @@
                     </p:cTn>
                   </p:par>
                   <p:par>
-                    <p:cTn id="27" fill="hold">
+                    <p:cTn id="21" fill="hold">
                       <p:stCondLst>
                         <p:cond delay="indefinite"/>
                       </p:stCondLst>
                       <p:childTnLst>
                         <p:par>
-                          <p:cTn id="28" fill="hold">
+                          <p:cTn id="22" fill="hold">
                             <p:stCondLst>
                               <p:cond delay="0"/>
                             </p:stCondLst>
                             <p:childTnLst>
                               <p:par>
-                                <p:cTn id="29" presetID="1" presetClass="entr" presetSubtype="0" fill="hold" grpId="0" nodeType="clickEffect">
+                                <p:cTn id="23" presetID="1" presetClass="entr" presetSubtype="0" fill="hold" grpId="0" nodeType="clickEffect">
                                   <p:stCondLst>
                                     <p:cond delay="0"/>
                                   </p:stCondLst>
                                   <p:childTnLst>
                                     <p:set>
                                       <p:cBhvr>
-                                        <p:cTn id="30" dur="1" fill="hold">
+                                        <p:cTn id="24" dur="1" fill="hold">
                                           <p:stCondLst>
                                             <p:cond delay="0"/>
                                           </p:stCondLst>

</xml_diff>